<commit_message>
some updated formattings, textual additions
</commit_message>
<xml_diff>
--- a/docs/SchemaDocumentation/nmrML_Poster_Schober.pptx
+++ b/docs/SchemaDocumentation/nmrML_Poster_Schober.pptx
@@ -3241,8 +3241,8 @@
         </p:nvSpPr>
         <p:spPr>
           <a:xfrm>
-            <a:off x="770595" y="29119711"/>
-            <a:ext cx="28536850" cy="5946497"/>
+            <a:off x="770594" y="29119711"/>
+            <a:ext cx="28856833" cy="5946497"/>
           </a:xfrm>
           <a:prstGeom prst="rect">
             <a:avLst/>
@@ -3270,7 +3270,7 @@
           <a:lstStyle/>
           <a:p>
             <a:pPr algn="ctr"/>
-            <a:endParaRPr lang="en-US"/>
+            <a:endParaRPr lang="en-US" dirty="0"/>
           </a:p>
         </p:txBody>
       </p:sp>
@@ -3483,7 +3483,7 @@
           <a:lstStyle/>
           <a:p>
             <a:pPr algn="ctr"/>
-            <a:endParaRPr lang="en-US"/>
+            <a:endParaRPr lang="en-US" dirty="0"/>
           </a:p>
         </p:txBody>
       </p:sp>
@@ -4194,8 +4194,8 @@
         </p:nvSpPr>
         <p:spPr>
           <a:xfrm>
-            <a:off x="1099664" y="36163445"/>
-            <a:ext cx="13433975" cy="1988237"/>
+            <a:off x="829482" y="36163445"/>
+            <a:ext cx="16677468" cy="1988237"/>
           </a:xfrm>
           <a:prstGeom prst="rect">
             <a:avLst/>
@@ -4466,7 +4466,7 @@
                 <a:latin typeface="Verdana"/>
                 <a:cs typeface="Verdana"/>
               </a:rPr>
-              <a:t>1,*</a:t>
+              <a:t>1</a:t>
             </a:r>
             <a:r>
               <a:rPr lang="en-US" sz="2400" dirty="0" smtClean="0">
@@ -5390,8 +5390,8 @@
         </p:blipFill>
         <p:spPr>
           <a:xfrm>
-            <a:off x="415590" y="40556274"/>
-            <a:ext cx="1547103" cy="1237683"/>
+            <a:off x="668579" y="41441262"/>
+            <a:ext cx="1294114" cy="876991"/>
           </a:xfrm>
           <a:prstGeom prst="rect">
             <a:avLst/>
@@ -5406,8 +5406,8 @@
         </p:nvSpPr>
         <p:spPr>
           <a:xfrm>
-            <a:off x="2871919" y="13128353"/>
-            <a:ext cx="5218866" cy="646331"/>
+            <a:off x="1962693" y="13043908"/>
+            <a:ext cx="6774679" cy="646331"/>
           </a:xfrm>
           <a:prstGeom prst="rect">
             <a:avLst/>
@@ -5452,6 +5452,28 @@
                 <a:cs typeface="Verdana" pitchFamily="34" charset="0"/>
               </a:rPr>
               <a:t>schema</a:t>
+            </a:r>
+            <a:r>
+              <a:rPr lang="de-DE" sz="3600" dirty="0" smtClean="0">
+                <a:solidFill>
+                  <a:srgbClr val="2F3246"/>
+                </a:solidFill>
+                <a:latin typeface="Verdana" pitchFamily="34" charset="0"/>
+                <a:ea typeface="Verdana" pitchFamily="34" charset="0"/>
+                <a:cs typeface="Verdana" pitchFamily="34" charset="0"/>
+              </a:rPr>
+              <a:t> </a:t>
+            </a:r>
+            <a:r>
+              <a:rPr lang="de-DE" sz="3600" dirty="0" err="1" smtClean="0">
+                <a:solidFill>
+                  <a:srgbClr val="2F3246"/>
+                </a:solidFill>
+                <a:latin typeface="Verdana" pitchFamily="34" charset="0"/>
+                <a:ea typeface="Verdana" pitchFamily="34" charset="0"/>
+                <a:cs typeface="Verdana" pitchFamily="34" charset="0"/>
+              </a:rPr>
+              <a:t>excerpt</a:t>
             </a:r>
             <a:endParaRPr lang="en-US" sz="3600" dirty="0">
               <a:solidFill>
@@ -5667,8 +5689,8 @@
         </p:nvSpPr>
         <p:spPr>
           <a:xfrm>
-            <a:off x="754043" y="9330979"/>
-            <a:ext cx="17394580" cy="2936188"/>
+            <a:off x="754043" y="8737851"/>
+            <a:ext cx="18473546" cy="3410164"/>
           </a:xfrm>
           <a:prstGeom prst="rect">
             <a:avLst/>
@@ -5840,7 +5862,67 @@
                 <a:latin typeface="Verdana"/>
                 <a:cs typeface="Verdana"/>
               </a:rPr>
-              <a:t>. The standard is composed of an </a:t>
+              <a:t>. </a:t>
+            </a:r>
+            <a:r>
+              <a:rPr lang="en-US" sz="2800" dirty="0" smtClean="0">
+                <a:solidFill>
+                  <a:srgbClr val="121421"/>
+                </a:solidFill>
+                <a:latin typeface="Verdana"/>
+                <a:cs typeface="Verdana"/>
+              </a:rPr>
+              <a:t>We largely follow design principles already established </a:t>
+            </a:r>
+            <a:r>
+              <a:rPr lang="en-US" sz="2800" dirty="0" smtClean="0">
+                <a:solidFill>
+                  <a:srgbClr val="121421"/>
+                </a:solidFill>
+                <a:latin typeface="Verdana"/>
+                <a:cs typeface="Verdana"/>
+              </a:rPr>
+              <a:t>in the Proteomics Standards Initiative (PSI) for the </a:t>
+            </a:r>
+            <a:r>
+              <a:rPr lang="en-US" sz="2800" dirty="0" err="1" smtClean="0">
+                <a:solidFill>
+                  <a:srgbClr val="121421"/>
+                </a:solidFill>
+                <a:latin typeface="Verdana"/>
+                <a:cs typeface="Verdana"/>
+              </a:rPr>
+              <a:t>mzML</a:t>
+            </a:r>
+            <a:r>
+              <a:rPr lang="en-US" sz="2800" dirty="0" smtClean="0">
+                <a:solidFill>
+                  <a:srgbClr val="121421"/>
+                </a:solidFill>
+                <a:latin typeface="Verdana"/>
+                <a:cs typeface="Verdana"/>
+              </a:rPr>
+              <a:t> data standard for mass spectrometry.</a:t>
+            </a:r>
+            <a:r>
+              <a:rPr lang="en-US" sz="2800" dirty="0" smtClean="0">
+                <a:solidFill>
+                  <a:srgbClr val="121421"/>
+                </a:solidFill>
+                <a:latin typeface="Verdana"/>
+                <a:cs typeface="Verdana"/>
+              </a:rPr>
+              <a:t> The </a:t>
+            </a:r>
+            <a:r>
+              <a:rPr lang="en-US" sz="2800" dirty="0" smtClean="0">
+                <a:solidFill>
+                  <a:srgbClr val="121421"/>
+                </a:solidFill>
+                <a:latin typeface="Verdana"/>
+                <a:cs typeface="Verdana"/>
+              </a:rPr>
+              <a:t>standard is composed of an </a:t>
             </a:r>
             <a:r>
               <a:rPr lang="en-US" sz="2800" b="1" dirty="0" smtClean="0">
@@ -5940,7 +6022,7 @@
         </p:nvSpPr>
         <p:spPr>
           <a:xfrm>
-            <a:off x="17955775" y="36580412"/>
+            <a:off x="18031213" y="36032463"/>
             <a:ext cx="10402543" cy="2169825"/>
           </a:xfrm>
           <a:prstGeom prst="rect">
@@ -6298,51 +6380,21 @@
           </a:prstGeom>
         </p:spPr>
       </p:pic>
-      <p:pic>
-        <p:nvPicPr>
-          <p:cNvPr id="9" name="Grafik 8"/>
-          <p:cNvPicPr>
-            <a:picLocks noChangeAspect="1"/>
-          </p:cNvPicPr>
+      <p:sp>
+        <p:nvSpPr>
+          <p:cNvPr id="11" name="Rechteck 10"/>
+          <p:cNvSpPr/>
           <p:nvPr/>
-        </p:nvPicPr>
-        <p:blipFill>
-          <a:blip r:embed="rId17">
-            <a:extLst>
-              <a:ext uri="{28A0092B-C50C-407E-A947-70E740481C1C}">
-                <a14:useLocalDpi xmlns:a14="http://schemas.microsoft.com/office/drawing/2010/main" val="0"/>
-              </a:ext>
-            </a:extLst>
-          </a:blip>
-          <a:stretch>
-            <a:fillRect/>
-          </a:stretch>
-        </p:blipFill>
+        </p:nvSpPr>
         <p:spPr>
           <a:xfrm>
-            <a:off x="1148059" y="29484777"/>
-            <a:ext cx="8619020" cy="5088537"/>
+            <a:off x="10936132" y="13988035"/>
+            <a:ext cx="8291457" cy="11664732"/>
           </a:xfrm>
           <a:prstGeom prst="rect">
             <a:avLst/>
           </a:prstGeom>
         </p:spPr>
-      </p:pic>
-      <p:sp>
-        <p:nvSpPr>
-          <p:cNvPr id="11" name="Rechteck 10"/>
-          <p:cNvSpPr/>
-          <p:nvPr/>
-        </p:nvSpPr>
-        <p:spPr>
-          <a:xfrm>
-            <a:off x="10857073" y="14197719"/>
-            <a:ext cx="8291457" cy="11105562"/>
-          </a:xfrm>
-          <a:prstGeom prst="rect">
-            <a:avLst/>
-          </a:prstGeom>
-        </p:spPr>
         <p:txBody>
           <a:bodyPr wrap="square">
             <a:spAutoFit/>
@@ -6350,7 +6402,80 @@
           <a:lstStyle/>
           <a:p>
             <a:r>
-              <a:rPr lang="en-US" sz="1200" dirty="0"/>
+              <a:rPr lang="en-US" sz="1200" dirty="0" smtClean="0"/>
+              <a:t>Data </a:t>
+            </a:r>
+            <a:r>
+              <a:rPr lang="en-US" sz="1200" dirty="0"/>
+              <a:t> </a:t>
+            </a:r>
+            <a:r>
+              <a:rPr lang="en-US" sz="1200" dirty="0" smtClean="0"/>
+              <a:t>from a paper: </a:t>
+            </a:r>
+            <a:r>
+              <a:rPr lang="en-US" sz="1200" dirty="0" err="1" smtClean="0"/>
+              <a:t>Farag</a:t>
+            </a:r>
+            <a:r>
+              <a:rPr lang="en-US" sz="1200" dirty="0"/>
+              <a:t>, M., </a:t>
+            </a:r>
+            <a:r>
+              <a:rPr lang="en-US" sz="1200" dirty="0" err="1"/>
+              <a:t>Porzel</a:t>
+            </a:r>
+            <a:r>
+              <a:rPr lang="en-US" sz="1200" dirty="0"/>
+              <a:t>, A., Schmidt, J. &amp; </a:t>
+            </a:r>
+            <a:r>
+              <a:rPr lang="en-US" sz="1200" dirty="0" err="1"/>
+              <a:t>Wessjohann</a:t>
+            </a:r>
+            <a:r>
+              <a:rPr lang="en-US" sz="1200" dirty="0"/>
+              <a:t>, L. Metabolite profiling and fingerprinting of commercial cultivars of </a:t>
+            </a:r>
+            <a:r>
+              <a:rPr lang="en-US" sz="1200" dirty="0" err="1"/>
+              <a:t>Humulus</a:t>
+            </a:r>
+            <a:r>
+              <a:rPr lang="en-US" sz="1200" dirty="0"/>
+              <a:t> </a:t>
+            </a:r>
+            <a:r>
+              <a:rPr lang="en-US" sz="1200" dirty="0" err="1"/>
+              <a:t>lupulus</a:t>
+            </a:r>
+            <a:r>
+              <a:rPr lang="en-US" sz="1200" dirty="0"/>
+              <a:t> L. (hop) - a </a:t>
+            </a:r>
+            <a:r>
+              <a:rPr lang="en-US" sz="1200" dirty="0" err="1"/>
+              <a:t>comparision</a:t>
+            </a:r>
+            <a:r>
+              <a:rPr lang="en-US" sz="1200" dirty="0"/>
+              <a:t> of MS and NMR methods in metabolomics </a:t>
+            </a:r>
+            <a:r>
+              <a:rPr lang="en-US" sz="1200" dirty="0" err="1"/>
+              <a:t>Metabolomics</a:t>
+            </a:r>
+            <a:r>
+              <a:rPr lang="en-US" sz="1200" dirty="0"/>
+              <a:t> 8, 492-507, (2012)</a:t>
+            </a:r>
+          </a:p>
+          <a:p>
+            <a:endParaRPr lang="en-US" sz="2000" dirty="0" smtClean="0"/>
+          </a:p>
+          <a:p>
+            <a:r>
+              <a:rPr lang="en-US" sz="1200" dirty="0" smtClean="0"/>
               <a:t>&lt;</a:t>
             </a:r>
             <a:r>
@@ -6626,7 +6751,7 @@
             </a:r>
             <a:r>
               <a:rPr lang="en-US" sz="1200" dirty="0">
-                <a:hlinkClick r:id="rId18" action="ppaction://hlinkfile"/>
+                <a:hlinkClick r:id="rId17" action="ppaction://hlinkfile"/>
               </a:rPr>
               <a:t>file:///Users/mike/Projects/nmrML/nmrML/examples/IPB_HopExample/FIDs/FAM013_AHTM.PROTON_04.fid/procpar</a:t>
             </a:r>
@@ -6729,7 +6854,7 @@
             </a:r>
             <a:r>
               <a:rPr lang="en-US" sz="1200" dirty="0">
-                <a:hlinkClick r:id="rId19" action="ppaction://hlinkfile"/>
+                <a:hlinkClick r:id="rId18" action="ppaction://hlinkfile"/>
               </a:rPr>
               <a:t>file:///Users/mike/Projects/nmrML/nmrML/examples/IPB_HopExample/FIDs/FAM013_AHTM.PROTON_04.fid/fid</a:t>
             </a:r>
@@ -7468,7 +7593,7 @@
           <p:nvPr/>
         </p:nvPicPr>
         <p:blipFill>
-          <a:blip r:embed="rId20">
+          <a:blip r:embed="rId19">
             <a:extLst>
               <a:ext uri="{28A0092B-C50C-407E-A947-70E740481C1C}">
                 <a14:useLocalDpi xmlns:a14="http://schemas.microsoft.com/office/drawing/2010/main" val="0"/>
@@ -7498,7 +7623,7 @@
           <p:nvPr/>
         </p:nvPicPr>
         <p:blipFill>
-          <a:blip r:embed="rId21">
+          <a:blip r:embed="rId20">
             <a:extLst>
               <a:ext uri="{28A0092B-C50C-407E-A947-70E740481C1C}">
                 <a14:useLocalDpi xmlns:a14="http://schemas.microsoft.com/office/drawing/2010/main" val="0"/>
@@ -7511,8 +7636,8 @@
         </p:blipFill>
         <p:spPr>
           <a:xfrm>
-            <a:off x="11165870" y="29800141"/>
-            <a:ext cx="5690284" cy="4844669"/>
+            <a:off x="9774585" y="29870629"/>
+            <a:ext cx="6159769" cy="4844669"/>
           </a:xfrm>
           <a:prstGeom prst="rect">
             <a:avLst/>
@@ -7528,7 +7653,7 @@
           <p:nvPr/>
         </p:nvPicPr>
         <p:blipFill>
-          <a:blip r:embed="rId22">
+          <a:blip r:embed="rId21">
             <a:extLst>
               <a:ext uri="{28A0092B-C50C-407E-A947-70E740481C1C}">
                 <a14:useLocalDpi xmlns:a14="http://schemas.microsoft.com/office/drawing/2010/main" val="0"/>
@@ -7541,8 +7666,8 @@
         </p:blipFill>
         <p:spPr>
           <a:xfrm>
-            <a:off x="17343598" y="29719883"/>
-            <a:ext cx="11482836" cy="4923266"/>
+            <a:off x="17049750" y="29883030"/>
+            <a:ext cx="12076167" cy="4923266"/>
           </a:xfrm>
           <a:prstGeom prst="rect">
             <a:avLst/>
@@ -7567,12 +7692,12 @@
           <a:graphicData uri="http://schemas.openxmlformats.org/presentationml/2006/ole">
             <mc:AlternateContent xmlns:mc="http://schemas.openxmlformats.org/markup-compatibility/2006">
               <mc:Choice xmlns:v="urn:schemas-microsoft-com:vml" Requires="v">
-                <p:oleObj spid="_x0000_s3074" r:id="rId23" imgW="155999880" imgH="75692160" progId="">
+                <p:oleObj spid="_x0000_s3082" r:id="rId22" imgW="155999880" imgH="75692160" progId="">
                   <p:embed/>
                 </p:oleObj>
               </mc:Choice>
               <mc:Fallback>
-                <p:oleObj r:id="rId23" imgW="155999880" imgH="75692160" progId="">
+                <p:oleObj r:id="rId22" imgW="155999880" imgH="75692160" progId="">
                   <p:embed/>
                   <p:pic>
                     <p:nvPicPr>
@@ -7581,7 +7706,7 @@
                       <p:nvPr/>
                     </p:nvPicPr>
                     <p:blipFill>
-                      <a:blip r:embed="rId24"/>
+                      <a:blip r:embed="rId23"/>
                       <a:stretch>
                         <a:fillRect/>
                       </a:stretch>
@@ -7611,7 +7736,7 @@
           <p:nvPr/>
         </p:nvPicPr>
         <p:blipFill>
-          <a:blip r:embed="rId25" cstate="email">
+          <a:blip r:embed="rId24" cstate="email">
             <a:extLst>
               <a:ext uri="{28A0092B-C50C-407E-A947-70E740481C1C}">
                 <a14:useLocalDpi xmlns:a14="http://schemas.microsoft.com/office/drawing/2010/main" val="0"/>
@@ -7681,7 +7806,7 @@
           <p:nvPr/>
         </p:nvPicPr>
         <p:blipFill>
-          <a:blip r:embed="rId26" cstate="email">
+          <a:blip r:embed="rId25" cstate="email">
             <a:extLst>
               <a:ext uri="{28A0092B-C50C-407E-A947-70E740481C1C}">
                 <a14:useLocalDpi xmlns:a14="http://schemas.microsoft.com/office/drawing/2010/main" val="0"/>
@@ -7721,7 +7846,7 @@
         </p:nvSpPr>
         <p:spPr>
           <a:xfrm>
-            <a:off x="754043" y="8244356"/>
+            <a:off x="667899" y="8034677"/>
             <a:ext cx="5041530" cy="646331"/>
           </a:xfrm>
           <a:prstGeom prst="rect">
@@ -7798,8 +7923,8 @@
         </p:nvSpPr>
         <p:spPr>
           <a:xfrm>
-            <a:off x="1025423" y="27239387"/>
-            <a:ext cx="18479704" cy="1514261"/>
+            <a:off x="754044" y="27239387"/>
+            <a:ext cx="28750574" cy="1040285"/>
           </a:xfrm>
           <a:prstGeom prst="rect">
             <a:avLst/>
@@ -7825,17 +7950,37 @@
                 <a:latin typeface="Verdana"/>
                 <a:cs typeface="Verdana"/>
               </a:rPr>
-              <a:t>We </a:t>
-            </a:r>
-            <a:r>
-              <a:rPr lang="en-US" sz="2800" dirty="0">
+              <a:t>We also deliver a </a:t>
+            </a:r>
+            <a:r>
+              <a:rPr lang="en-US" sz="2800" b="1" dirty="0" smtClean="0">
+                <a:solidFill>
+                  <a:schemeClr val="accent1"/>
+                </a:solidFill>
+                <a:latin typeface="Verdana"/>
+                <a:cs typeface="Verdana"/>
+              </a:rPr>
+              <a:t>content validator</a:t>
+            </a:r>
+            <a:r>
+              <a:rPr lang="en-US" sz="2800" dirty="0" smtClean="0">
                 <a:solidFill>
                   <a:srgbClr val="121421"/>
                 </a:solidFill>
                 <a:latin typeface="Verdana"/>
                 <a:cs typeface="Verdana"/>
               </a:rPr>
-              <a:t>also deliver </a:t>
+              <a:t> which checks a data file is syntactically well formatted, sufficiently complete and that aspects of </a:t>
+            </a:r>
+            <a:r>
+              <a:rPr lang="en-US" sz="2800" b="1" dirty="0" smtClean="0">
+                <a:solidFill>
+                  <a:srgbClr val="0070C0"/>
+                </a:solidFill>
+                <a:latin typeface="Verdana"/>
+                <a:cs typeface="Verdana"/>
+              </a:rPr>
+              <a:t>minimal information requirements</a:t>
             </a:r>
             <a:r>
               <a:rPr lang="en-US" sz="2800" dirty="0" smtClean="0">
@@ -7845,87 +7990,7 @@
                 <a:latin typeface="Verdana"/>
                 <a:cs typeface="Verdana"/>
               </a:rPr>
-              <a:t>a </a:t>
-            </a:r>
-            <a:r>
-              <a:rPr lang="en-US" sz="2800" b="1" dirty="0" smtClean="0">
-                <a:solidFill>
-                  <a:schemeClr val="accent1"/>
-                </a:solidFill>
-                <a:latin typeface="Verdana"/>
-                <a:cs typeface="Verdana"/>
-              </a:rPr>
-              <a:t>content </a:t>
-            </a:r>
-            <a:r>
-              <a:rPr lang="en-US" sz="2800" b="1" dirty="0">
-                <a:solidFill>
-                  <a:schemeClr val="accent1"/>
-                </a:solidFill>
-                <a:latin typeface="Verdana"/>
-                <a:cs typeface="Verdana"/>
-              </a:rPr>
-              <a:t>validator</a:t>
-            </a:r>
-            <a:r>
-              <a:rPr lang="en-US" sz="2800" dirty="0">
-                <a:solidFill>
-                  <a:srgbClr val="121421"/>
-                </a:solidFill>
-                <a:latin typeface="Verdana"/>
-                <a:cs typeface="Verdana"/>
-              </a:rPr>
-              <a:t> which </a:t>
-            </a:r>
-            <a:r>
-              <a:rPr lang="en-US" sz="2800" dirty="0" smtClean="0">
-                <a:solidFill>
-                  <a:srgbClr val="121421"/>
-                </a:solidFill>
-                <a:latin typeface="Verdana"/>
-                <a:cs typeface="Verdana"/>
-              </a:rPr>
-              <a:t>checks a data file is syntactically well formatted, sufficiently complete and that aspects of minimal </a:t>
-            </a:r>
-            <a:r>
-              <a:rPr lang="en-US" sz="2800" dirty="0">
-                <a:solidFill>
-                  <a:srgbClr val="121421"/>
-                </a:solidFill>
-                <a:latin typeface="Verdana"/>
-                <a:cs typeface="Verdana"/>
-              </a:rPr>
-              <a:t>information requirements </a:t>
-            </a:r>
-            <a:r>
-              <a:rPr lang="en-US" sz="2800" dirty="0" smtClean="0">
-                <a:solidFill>
-                  <a:srgbClr val="121421"/>
-                </a:solidFill>
-                <a:latin typeface="Verdana"/>
-                <a:cs typeface="Verdana"/>
-              </a:rPr>
-              <a:t>like the </a:t>
-            </a:r>
-            <a:r>
-              <a:rPr lang="en-US" sz="2800" dirty="0">
-                <a:solidFill>
-                  <a:srgbClr val="121421"/>
-                </a:solidFill>
-                <a:latin typeface="Verdana"/>
-                <a:cs typeface="Verdana"/>
-              </a:rPr>
-              <a:t>Core Information for Metabolomics Reporting </a:t>
-            </a:r>
-            <a:r>
-              <a:rPr lang="en-US" sz="2800" dirty="0" smtClean="0">
-                <a:solidFill>
-                  <a:srgbClr val="121421"/>
-                </a:solidFill>
-                <a:latin typeface="Verdana"/>
-                <a:cs typeface="Verdana"/>
-              </a:rPr>
-              <a:t>(CIMS) are met.</a:t>
+              <a:t> like the Core Information for Metabolomics Reporting (CIMS) are met.</a:t>
             </a:r>
             <a:endParaRPr lang="ro-RO" sz="2800" dirty="0">
               <a:solidFill>
@@ -7945,8 +8010,8 @@
         </p:nvSpPr>
         <p:spPr>
           <a:xfrm>
-            <a:off x="920347" y="26327992"/>
-            <a:ext cx="2724912" cy="646331"/>
+            <a:off x="810430" y="26305088"/>
+            <a:ext cx="2711809" cy="646331"/>
           </a:xfrm>
           <a:prstGeom prst="rect">
             <a:avLst/>
@@ -7989,7 +8054,7 @@
         </p:nvSpPr>
         <p:spPr>
           <a:xfrm>
-            <a:off x="1054240" y="35354176"/>
+            <a:off x="797327" y="35354176"/>
             <a:ext cx="2724912" cy="646331"/>
           </a:xfrm>
           <a:prstGeom prst="rect">
@@ -8033,7 +8098,7 @@
         </p:nvSpPr>
         <p:spPr>
           <a:xfrm>
-            <a:off x="18455741" y="35685702"/>
+            <a:off x="18363671" y="35263649"/>
             <a:ext cx="6283476" cy="646331"/>
           </a:xfrm>
           <a:prstGeom prst="rect">
@@ -8205,7 +8270,7 @@
                 <a:latin typeface="Verdana" pitchFamily="34" charset="0"/>
                 <a:ea typeface="Verdana" pitchFamily="34" charset="0"/>
                 <a:cs typeface="Verdana" pitchFamily="34" charset="0"/>
-                <a:hlinkClick r:id="rId27"/>
+                <a:hlinkClick r:id="rId26"/>
               </a:rPr>
               <a:t>http://www.ebi.ac.uk/metabolights/</a:t>
             </a:r>
@@ -8260,7 +8325,7 @@
                 <a:latin typeface="Verdana" pitchFamily="34" charset="0"/>
                 <a:ea typeface="Verdana" pitchFamily="34" charset="0"/>
                 <a:cs typeface="Verdana" pitchFamily="34" charset="0"/>
-                <a:hlinkClick r:id="rId28"/>
+                <a:hlinkClick r:id="rId27"/>
               </a:rPr>
               <a:t>http://msi-workgroups.sourceforge.net/</a:t>
             </a:r>
@@ -8315,7 +8380,7 @@
                 <a:latin typeface="Verdana" pitchFamily="34" charset="0"/>
                 <a:ea typeface="Verdana" pitchFamily="34" charset="0"/>
                 <a:cs typeface="Verdana" pitchFamily="34" charset="0"/>
-                <a:hlinkClick r:id="rId29"/>
+                <a:hlinkClick r:id="rId28"/>
               </a:rPr>
               <a:t>http://mibbi.sourceforge.net/projects/CIMR.shtml</a:t>
             </a:r>
@@ -8344,7 +8409,7 @@
         </p:nvSpPr>
         <p:spPr>
           <a:xfrm>
-            <a:off x="15264742" y="40022338"/>
+            <a:off x="15957886" y="82309143"/>
             <a:ext cx="3380663" cy="461665"/>
           </a:xfrm>
           <a:prstGeom prst="rect">
@@ -8391,6 +8456,199 @@
           </a:p>
         </p:txBody>
       </p:sp>
+      <p:pic>
+        <p:nvPicPr>
+          <p:cNvPr id="14" name="Grafik 13"/>
+          <p:cNvPicPr>
+            <a:picLocks noChangeAspect="1"/>
+          </p:cNvPicPr>
+          <p:nvPr/>
+        </p:nvPicPr>
+        <p:blipFill>
+          <a:blip r:embed="rId29">
+            <a:extLst>
+              <a:ext uri="{28A0092B-C50C-407E-A947-70E740481C1C}">
+                <a14:useLocalDpi xmlns:a14="http://schemas.microsoft.com/office/drawing/2010/main" val="0"/>
+              </a:ext>
+            </a:extLst>
+          </a:blip>
+          <a:stretch>
+            <a:fillRect/>
+          </a:stretch>
+        </p:blipFill>
+        <p:spPr>
+          <a:xfrm>
+            <a:off x="1216698" y="29984314"/>
+            <a:ext cx="7184352" cy="4826987"/>
+          </a:xfrm>
+          <a:prstGeom prst="rect">
+            <a:avLst/>
+          </a:prstGeom>
+        </p:spPr>
+      </p:pic>
+      <p:sp>
+        <p:nvSpPr>
+          <p:cNvPr id="18" name="Textfeld 17"/>
+          <p:cNvSpPr txBox="1"/>
+          <p:nvPr/>
+        </p:nvSpPr>
+        <p:spPr>
+          <a:xfrm>
+            <a:off x="1371668" y="29366807"/>
+            <a:ext cx="3000501" cy="461665"/>
+          </a:xfrm>
+          <a:prstGeom prst="rect">
+            <a:avLst/>
+          </a:prstGeom>
+          <a:noFill/>
+        </p:spPr>
+        <p:txBody>
+          <a:bodyPr wrap="none" rtlCol="0">
+            <a:spAutoFit/>
+          </a:bodyPr>
+          <a:lstStyle/>
+          <a:p>
+            <a:r>
+              <a:rPr lang="de-DE" sz="2400" dirty="0" smtClean="0"/>
+              <a:t>Validation Layer </a:t>
+            </a:r>
+            <a:r>
+              <a:rPr lang="de-DE" sz="2400" dirty="0" err="1" smtClean="0"/>
+              <a:t>Onion</a:t>
+            </a:r>
+            <a:endParaRPr lang="en-US" sz="2400" dirty="0"/>
+          </a:p>
+        </p:txBody>
+      </p:sp>
+      <p:sp>
+        <p:nvSpPr>
+          <p:cNvPr id="50" name="Textfeld 49"/>
+          <p:cNvSpPr txBox="1"/>
+          <p:nvPr/>
+        </p:nvSpPr>
+        <p:spPr>
+          <a:xfrm>
+            <a:off x="17035554" y="29317152"/>
+            <a:ext cx="3972882" cy="461665"/>
+          </a:xfrm>
+          <a:prstGeom prst="rect">
+            <a:avLst/>
+          </a:prstGeom>
+          <a:noFill/>
+        </p:spPr>
+        <p:txBody>
+          <a:bodyPr wrap="none" rtlCol="0">
+            <a:spAutoFit/>
+          </a:bodyPr>
+          <a:lstStyle/>
+          <a:p>
+            <a:r>
+              <a:rPr lang="de-DE" sz="2400" dirty="0" smtClean="0"/>
+              <a:t>Validation </a:t>
+            </a:r>
+            <a:r>
+              <a:rPr lang="de-DE" sz="2400" dirty="0" err="1" smtClean="0"/>
+              <a:t>webservice</a:t>
+            </a:r>
+            <a:r>
+              <a:rPr lang="de-DE" sz="2400" dirty="0" smtClean="0"/>
+              <a:t> &amp; </a:t>
+            </a:r>
+            <a:r>
+              <a:rPr lang="de-DE" sz="2400" dirty="0" err="1" smtClean="0"/>
+              <a:t>result</a:t>
+            </a:r>
+            <a:endParaRPr lang="en-US" sz="2400" dirty="0"/>
+          </a:p>
+        </p:txBody>
+      </p:sp>
+      <p:sp>
+        <p:nvSpPr>
+          <p:cNvPr id="51" name="Textfeld 50"/>
+          <p:cNvSpPr txBox="1"/>
+          <p:nvPr/>
+        </p:nvSpPr>
+        <p:spPr>
+          <a:xfrm>
+            <a:off x="9774585" y="29288886"/>
+            <a:ext cx="2925353" cy="461665"/>
+          </a:xfrm>
+          <a:prstGeom prst="rect">
+            <a:avLst/>
+          </a:prstGeom>
+          <a:noFill/>
+        </p:spPr>
+        <p:txBody>
+          <a:bodyPr wrap="none" rtlCol="0">
+            <a:spAutoFit/>
+          </a:bodyPr>
+          <a:lstStyle/>
+          <a:p>
+            <a:r>
+              <a:rPr lang="de-DE" sz="2400" dirty="0" smtClean="0"/>
+              <a:t>Validation </a:t>
+            </a:r>
+            <a:r>
+              <a:rPr lang="de-DE" sz="2400" dirty="0" err="1" smtClean="0"/>
+              <a:t>rules</a:t>
+            </a:r>
+            <a:r>
+              <a:rPr lang="de-DE" sz="2400" dirty="0" smtClean="0"/>
+              <a:t> (</a:t>
+            </a:r>
+            <a:r>
+              <a:rPr lang="de-DE" sz="2400" dirty="0" err="1" smtClean="0"/>
+              <a:t>html</a:t>
+            </a:r>
+            <a:r>
+              <a:rPr lang="de-DE" sz="2400" dirty="0" smtClean="0"/>
+              <a:t>)</a:t>
+            </a:r>
+            <a:endParaRPr lang="en-US" sz="2400" dirty="0"/>
+          </a:p>
+        </p:txBody>
+      </p:sp>
+      <p:pic>
+        <p:nvPicPr>
+          <p:cNvPr id="3080" name="Picture 8" descr="EU-Flagge"/>
+          <p:cNvPicPr>
+            <a:picLocks noChangeAspect="1" noChangeArrowheads="1"/>
+          </p:cNvPicPr>
+          <p:nvPr/>
+        </p:nvPicPr>
+        <p:blipFill>
+          <a:blip r:embed="rId30">
+            <a:extLst>
+              <a:ext uri="{28A0092B-C50C-407E-A947-70E740481C1C}">
+                <a14:useLocalDpi xmlns:a14="http://schemas.microsoft.com/office/drawing/2010/main" val="0"/>
+              </a:ext>
+            </a:extLst>
+          </a:blip>
+          <a:srcRect/>
+          <a:stretch>
+            <a:fillRect/>
+          </a:stretch>
+        </p:blipFill>
+        <p:spPr bwMode="auto">
+          <a:xfrm>
+            <a:off x="633434" y="40123928"/>
+            <a:ext cx="1337368" cy="1197645"/>
+          </a:xfrm>
+          <a:prstGeom prst="rect">
+            <a:avLst/>
+          </a:prstGeom>
+          <a:noFill/>
+          <a:extLst>
+            <a:ext uri="{909E8E84-426E-40DD-AFC4-6F175D3DCCD1}">
+              <a14:hiddenFill xmlns:a14="http://schemas.microsoft.com/office/drawing/2010/main">
+                <a:solidFill>
+                  <a:srgbClr val="FFFFFF"/>
+                </a:solidFill>
+              </a14:hiddenFill>
+            </a:ext>
+          </a:extLst>
+        </p:spPr>
+      </p:pic>
     </p:spTree>
     <p:extLst>
       <p:ext uri="{BB962C8B-B14F-4D97-AF65-F5344CB8AC3E}">

</xml_diff>

<commit_message>
working but simplified obo CV of full ontology: Deleted BFO import and all comment metadata like def: and synonym: ... these caused the OBO Edit parser to moan. Also the strange id_space: NMR480 http://nmrML.org/nmrCV#NMR:1400234 assertions were deleted. This is now valid OBO format that actually opens in OBO Edit.
</commit_message>
<xml_diff>
--- a/docs/SchemaDocumentation/nmrML_Poster_Schober.pptx
+++ b/docs/SchemaDocumentation/nmrML_Poster_Schober.pptx
@@ -6,6 +6,8 @@
   </p:sldMasterIdLst>
   <p:sldIdLst>
     <p:sldId id="257" r:id="rId2"/>
+    <p:sldId id="258" r:id="rId3"/>
+    <p:sldId id="259" r:id="rId4"/>
   </p:sldIdLst>
   <p:sldSz cx="30275213" cy="42811700"/>
   <p:notesSz cx="6797675" cy="9928225"/>
@@ -390,7 +392,7 @@
             <a:fld id="{220332FB-83C8-E24C-BAB1-A588F05ACF5F}" type="datetimeFigureOut">
               <a:rPr lang="en-US" smtClean="0"/>
               <a:pPr/>
-              <a:t>5/7/2014</a:t>
+              <a:t>5/12/2014</a:t>
             </a:fld>
             <a:endParaRPr lang="en-US"/>
           </a:p>
@@ -562,7 +564,7 @@
             <a:fld id="{220332FB-83C8-E24C-BAB1-A588F05ACF5F}" type="datetimeFigureOut">
               <a:rPr lang="en-US" smtClean="0"/>
               <a:pPr/>
-              <a:t>5/7/2014</a:t>
+              <a:t>5/12/2014</a:t>
             </a:fld>
             <a:endParaRPr lang="en-US"/>
           </a:p>
@@ -744,7 +746,7 @@
             <a:fld id="{220332FB-83C8-E24C-BAB1-A588F05ACF5F}" type="datetimeFigureOut">
               <a:rPr lang="en-US" smtClean="0"/>
               <a:pPr/>
-              <a:t>5/7/2014</a:t>
+              <a:t>5/12/2014</a:t>
             </a:fld>
             <a:endParaRPr lang="en-US"/>
           </a:p>
@@ -916,7 +918,7 @@
             <a:fld id="{220332FB-83C8-E24C-BAB1-A588F05ACF5F}" type="datetimeFigureOut">
               <a:rPr lang="en-US" smtClean="0"/>
               <a:pPr/>
-              <a:t>5/7/2014</a:t>
+              <a:t>5/12/2014</a:t>
             </a:fld>
             <a:endParaRPr lang="en-US"/>
           </a:p>
@@ -1164,7 +1166,7 @@
             <a:fld id="{220332FB-83C8-E24C-BAB1-A588F05ACF5F}" type="datetimeFigureOut">
               <a:rPr lang="en-US" smtClean="0"/>
               <a:pPr/>
-              <a:t>5/7/2014</a:t>
+              <a:t>5/12/2014</a:t>
             </a:fld>
             <a:endParaRPr lang="en-US"/>
           </a:p>
@@ -1454,7 +1456,7 @@
             <a:fld id="{220332FB-83C8-E24C-BAB1-A588F05ACF5F}" type="datetimeFigureOut">
               <a:rPr lang="en-US" smtClean="0"/>
               <a:pPr/>
-              <a:t>5/7/2014</a:t>
+              <a:t>5/12/2014</a:t>
             </a:fld>
             <a:endParaRPr lang="en-US"/>
           </a:p>
@@ -1883,7 +1885,7 @@
             <a:fld id="{220332FB-83C8-E24C-BAB1-A588F05ACF5F}" type="datetimeFigureOut">
               <a:rPr lang="en-US" smtClean="0"/>
               <a:pPr/>
-              <a:t>5/7/2014</a:t>
+              <a:t>5/12/2014</a:t>
             </a:fld>
             <a:endParaRPr lang="en-US"/>
           </a:p>
@@ -2003,7 +2005,7 @@
             <a:fld id="{220332FB-83C8-E24C-BAB1-A588F05ACF5F}" type="datetimeFigureOut">
               <a:rPr lang="en-US" smtClean="0"/>
               <a:pPr/>
-              <a:t>5/7/2014</a:t>
+              <a:t>5/12/2014</a:t>
             </a:fld>
             <a:endParaRPr lang="en-US"/>
           </a:p>
@@ -2100,7 +2102,7 @@
             <a:fld id="{220332FB-83C8-E24C-BAB1-A588F05ACF5F}" type="datetimeFigureOut">
               <a:rPr lang="en-US" smtClean="0"/>
               <a:pPr/>
-              <a:t>5/7/2014</a:t>
+              <a:t>5/12/2014</a:t>
             </a:fld>
             <a:endParaRPr lang="en-US"/>
           </a:p>
@@ -2379,7 +2381,7 @@
             <a:fld id="{220332FB-83C8-E24C-BAB1-A588F05ACF5F}" type="datetimeFigureOut">
               <a:rPr lang="en-US" smtClean="0"/>
               <a:pPr/>
-              <a:t>5/7/2014</a:t>
+              <a:t>5/12/2014</a:t>
             </a:fld>
             <a:endParaRPr lang="en-US"/>
           </a:p>
@@ -2634,7 +2636,7 @@
             <a:fld id="{220332FB-83C8-E24C-BAB1-A588F05ACF5F}" type="datetimeFigureOut">
               <a:rPr lang="en-US" smtClean="0"/>
               <a:pPr/>
-              <a:t>5/7/2014</a:t>
+              <a:t>5/12/2014</a:t>
             </a:fld>
             <a:endParaRPr lang="en-US"/>
           </a:p>
@@ -2849,7 +2851,7 @@
             <a:fld id="{220332FB-83C8-E24C-BAB1-A588F05ACF5F}" type="datetimeFigureOut">
               <a:rPr lang="en-US" smtClean="0"/>
               <a:pPr/>
-              <a:t>5/7/2014</a:t>
+              <a:t>5/12/2014</a:t>
             </a:fld>
             <a:endParaRPr lang="en-US"/>
           </a:p>
@@ -3282,7 +3284,7 @@
         </p:nvSpPr>
         <p:spPr>
           <a:xfrm>
-            <a:off x="20259490" y="22159089"/>
+            <a:off x="20184052" y="22159089"/>
             <a:ext cx="9245128" cy="3955772"/>
           </a:xfrm>
           <a:prstGeom prst="rect">
@@ -4003,7 +4005,7 @@
         </p:nvSpPr>
         <p:spPr>
           <a:xfrm>
-            <a:off x="20280163" y="20026899"/>
+            <a:off x="20117173" y="20051041"/>
             <a:ext cx="9394305" cy="1988237"/>
           </a:xfrm>
           <a:prstGeom prst="rect">
@@ -4150,7 +4152,7 @@
         </p:nvSpPr>
         <p:spPr>
           <a:xfrm>
-            <a:off x="20280163" y="19280674"/>
+            <a:off x="20142953" y="19223128"/>
             <a:ext cx="2724912" cy="646331"/>
           </a:xfrm>
           <a:prstGeom prst="rect">
@@ -4234,14 +4236,14 @@
               <a:t>expanded for better processed data and </a:t>
             </a:r>
             <a:r>
-              <a:rPr lang="en-US" sz="2800" b="1" dirty="0" err="1">
+              <a:rPr lang="en-US" sz="2800" b="1" dirty="0" smtClean="0">
                 <a:solidFill>
                   <a:schemeClr val="accent1"/>
                 </a:solidFill>
                 <a:latin typeface="Verdana"/>
                 <a:cs typeface="Verdana"/>
               </a:rPr>
-              <a:t>quantifiction</a:t>
+              <a:t>quantification </a:t>
             </a:r>
             <a:r>
               <a:rPr lang="en-US" sz="2800" b="1" dirty="0">
@@ -4251,7 +4253,7 @@
                 <a:latin typeface="Verdana"/>
                 <a:cs typeface="Verdana"/>
               </a:rPr>
-              <a:t> data</a:t>
+              <a:t>data</a:t>
             </a:r>
             <a:r>
               <a:rPr lang="en-US" sz="2800" dirty="0" smtClean="0">
@@ -4311,7 +4313,7 @@
                 <a:latin typeface="Verdana"/>
                 <a:cs typeface="Verdana"/>
               </a:rPr>
-              <a:t>metabolights</a:t>
+              <a:t>MetaboLights</a:t>
             </a:r>
             <a:r>
               <a:rPr lang="en-US" sz="2800" dirty="0" smtClean="0">
@@ -5994,7 +5996,7 @@
         <p:spPr>
           <a:xfrm>
             <a:off x="18031213" y="36470124"/>
-            <a:ext cx="10402543" cy="2169825"/>
+            <a:ext cx="10402543" cy="2585323"/>
           </a:xfrm>
           <a:prstGeom prst="rect">
             <a:avLst/>
@@ -6139,6 +6141,17 @@
               </a:rPr>
               <a:t> </a:t>
             </a:r>
+            <a:endParaRPr lang="de-DE" sz="1800" dirty="0" smtClean="0">
+              <a:solidFill>
+                <a:schemeClr val="tx1">
+                  <a:lumMod val="50000"/>
+                  <a:lumOff val="50000"/>
+                </a:schemeClr>
+              </a:solidFill>
+              <a:latin typeface="Verdana" pitchFamily="34" charset="0"/>
+              <a:ea typeface="Verdana" pitchFamily="34" charset="0"/>
+              <a:cs typeface="Verdana" pitchFamily="34" charset="0"/>
+            </a:endParaRPr>
           </a:p>
           <a:p>
             <a:pPr marL="449263" lvl="1" indent="363538" defTabSz="623888">
@@ -6152,7 +6165,7 @@
               </a:tabLst>
             </a:pPr>
             <a:r>
-              <a:rPr lang="de-DE" sz="1800" dirty="0" err="1">
+              <a:rPr lang="de-DE" sz="1800" dirty="0" err="1" smtClean="0">
                 <a:solidFill>
                   <a:schemeClr val="tx1">
                     <a:lumMod val="50000"/>
@@ -6163,10 +6176,10 @@
                 <a:ea typeface="Verdana" pitchFamily="34" charset="0"/>
                 <a:cs typeface="Verdana" pitchFamily="34" charset="0"/>
               </a:rPr>
-              <a:t>Cosmos</a:t>
-            </a:r>
-            <a:r>
-              <a:rPr lang="de-DE" sz="1800" dirty="0">
+              <a:t>nmrML</a:t>
+            </a:r>
+            <a:r>
+              <a:rPr lang="de-DE" sz="1800" dirty="0" smtClean="0">
                 <a:solidFill>
                   <a:schemeClr val="tx1">
                     <a:lumMod val="50000"/>
@@ -6177,10 +6190,10 @@
                 <a:ea typeface="Verdana" pitchFamily="34" charset="0"/>
                 <a:cs typeface="Verdana" pitchFamily="34" charset="0"/>
               </a:rPr>
-              <a:t>: </a:t>
-            </a:r>
-            <a:r>
-              <a:rPr lang="de-DE" sz="1800" dirty="0">
+              <a:t> </a:t>
+            </a:r>
+            <a:r>
+              <a:rPr lang="de-DE" sz="1800" dirty="0" err="1" smtClean="0">
                 <a:solidFill>
                   <a:schemeClr val="tx1">
                     <a:lumMod val="50000"/>
@@ -6190,9 +6203,8 @@
                 <a:latin typeface="Verdana" pitchFamily="34" charset="0"/>
                 <a:ea typeface="Verdana" pitchFamily="34" charset="0"/>
                 <a:cs typeface="Verdana" pitchFamily="34" charset="0"/>
-                <a:hlinkClick r:id="rId13"/>
-              </a:rPr>
-              <a:t>http://www.cosmos-fp7.eu/</a:t>
+              </a:rPr>
+              <a:t>validator</a:t>
             </a:r>
             <a:r>
               <a:rPr lang="de-DE" sz="1800" dirty="0">
@@ -6206,8 +6218,63 @@
                 <a:ea typeface="Verdana" pitchFamily="34" charset="0"/>
                 <a:cs typeface="Verdana" pitchFamily="34" charset="0"/>
               </a:rPr>
-              <a:t>  </a:t>
-            </a:r>
+              <a:t>: </a:t>
+            </a:r>
+            <a:r>
+              <a:rPr lang="de-DE" sz="1800" dirty="0">
+                <a:solidFill>
+                  <a:schemeClr val="tx1">
+                    <a:lumMod val="50000"/>
+                    <a:lumOff val="50000"/>
+                  </a:schemeClr>
+                </a:solidFill>
+                <a:latin typeface="Verdana" pitchFamily="34" charset="0"/>
+                <a:ea typeface="Verdana" pitchFamily="34" charset="0"/>
+                <a:cs typeface="Verdana" pitchFamily="34" charset="0"/>
+                <a:hlinkClick r:id="rId13"/>
+              </a:rPr>
+              <a:t>http://</a:t>
+            </a:r>
+            <a:r>
+              <a:rPr lang="de-DE" sz="1800" dirty="0" smtClean="0">
+                <a:solidFill>
+                  <a:schemeClr val="tx1">
+                    <a:lumMod val="50000"/>
+                    <a:lumOff val="50000"/>
+                  </a:schemeClr>
+                </a:solidFill>
+                <a:latin typeface="Verdana" pitchFamily="34" charset="0"/>
+                <a:ea typeface="Verdana" pitchFamily="34" charset="0"/>
+                <a:cs typeface="Verdana" pitchFamily="34" charset="0"/>
+                <a:hlinkClick r:id="rId13"/>
+              </a:rPr>
+              <a:t>msbi.ipb-halle.de/nmrML/index.php</a:t>
+            </a:r>
+            <a:r>
+              <a:rPr lang="de-DE" sz="1800" dirty="0" smtClean="0">
+                <a:solidFill>
+                  <a:schemeClr val="tx1">
+                    <a:lumMod val="50000"/>
+                    <a:lumOff val="50000"/>
+                  </a:schemeClr>
+                </a:solidFill>
+                <a:latin typeface="Verdana" pitchFamily="34" charset="0"/>
+                <a:ea typeface="Verdana" pitchFamily="34" charset="0"/>
+                <a:cs typeface="Verdana" pitchFamily="34" charset="0"/>
+              </a:rPr>
+              <a:t> </a:t>
+            </a:r>
+            <a:endParaRPr lang="de-DE" sz="1800" dirty="0">
+              <a:solidFill>
+                <a:schemeClr val="tx1">
+                  <a:lumMod val="50000"/>
+                  <a:lumOff val="50000"/>
+                </a:schemeClr>
+              </a:solidFill>
+              <a:latin typeface="Verdana" pitchFamily="34" charset="0"/>
+              <a:ea typeface="Verdana" pitchFamily="34" charset="0"/>
+              <a:cs typeface="Verdana" pitchFamily="34" charset="0"/>
+            </a:endParaRPr>
           </a:p>
           <a:p>
             <a:pPr marL="449263" lvl="1" indent="363538" defTabSz="623888">
@@ -6221,7 +6288,7 @@
               </a:tabLst>
             </a:pPr>
             <a:r>
-              <a:rPr lang="de-DE" sz="1800" dirty="0">
+              <a:rPr lang="de-DE" sz="1800" dirty="0" err="1">
                 <a:solidFill>
                   <a:schemeClr val="tx1">
                     <a:lumMod val="50000"/>
@@ -6232,7 +6299,7 @@
                 <a:ea typeface="Verdana" pitchFamily="34" charset="0"/>
                 <a:cs typeface="Verdana" pitchFamily="34" charset="0"/>
               </a:rPr>
-              <a:t>Email: </a:t>
+              <a:t>Cosmos</a:t>
             </a:r>
             <a:r>
               <a:rPr lang="de-DE" sz="1800" dirty="0">
@@ -6245,9 +6312,8 @@
                 <a:latin typeface="Verdana" pitchFamily="34" charset="0"/>
                 <a:ea typeface="Verdana" pitchFamily="34" charset="0"/>
                 <a:cs typeface="Verdana" pitchFamily="34" charset="0"/>
-                <a:hlinkClick r:id="rId14"/>
-              </a:rPr>
-              <a:t>info@nmrml.org</a:t>
+              </a:rPr>
+              <a:t>: </a:t>
             </a:r>
             <a:r>
               <a:rPr lang="de-DE" sz="1800" dirty="0">
@@ -6260,8 +6326,23 @@
                 <a:latin typeface="Verdana" pitchFamily="34" charset="0"/>
                 <a:ea typeface="Verdana" pitchFamily="34" charset="0"/>
                 <a:cs typeface="Verdana" pitchFamily="34" charset="0"/>
-              </a:rPr>
-              <a:t> </a:t>
+                <a:hlinkClick r:id="rId14"/>
+              </a:rPr>
+              <a:t>http://www.cosmos-fp7.eu/</a:t>
+            </a:r>
+            <a:r>
+              <a:rPr lang="de-DE" sz="1800" dirty="0">
+                <a:solidFill>
+                  <a:schemeClr val="tx1">
+                    <a:lumMod val="50000"/>
+                    <a:lumOff val="50000"/>
+                  </a:schemeClr>
+                </a:solidFill>
+                <a:latin typeface="Verdana" pitchFamily="34" charset="0"/>
+                <a:ea typeface="Verdana" pitchFamily="34" charset="0"/>
+                <a:cs typeface="Verdana" pitchFamily="34" charset="0"/>
+              </a:rPr>
+              <a:t>  </a:t>
             </a:r>
           </a:p>
           <a:p>
@@ -6287,7 +6368,7 @@
                 <a:ea typeface="Verdana" pitchFamily="34" charset="0"/>
                 <a:cs typeface="Verdana" pitchFamily="34" charset="0"/>
               </a:rPr>
-              <a:t>Google Group: </a:t>
+              <a:t>Email: </a:t>
             </a:r>
             <a:r>
               <a:rPr lang="de-DE" sz="1800" dirty="0">
@@ -6301,6 +6382,61 @@
                 <a:ea typeface="Verdana" pitchFamily="34" charset="0"/>
                 <a:cs typeface="Verdana" pitchFamily="34" charset="0"/>
                 <a:hlinkClick r:id="rId15"/>
+              </a:rPr>
+              <a:t>info@nmrml.org</a:t>
+            </a:r>
+            <a:r>
+              <a:rPr lang="de-DE" sz="1800" dirty="0">
+                <a:solidFill>
+                  <a:schemeClr val="tx1">
+                    <a:lumMod val="50000"/>
+                    <a:lumOff val="50000"/>
+                  </a:schemeClr>
+                </a:solidFill>
+                <a:latin typeface="Verdana" pitchFamily="34" charset="0"/>
+                <a:ea typeface="Verdana" pitchFamily="34" charset="0"/>
+                <a:cs typeface="Verdana" pitchFamily="34" charset="0"/>
+              </a:rPr>
+              <a:t> </a:t>
+            </a:r>
+          </a:p>
+          <a:p>
+            <a:pPr marL="449263" lvl="1" indent="363538" defTabSz="623888">
+              <a:lnSpc>
+                <a:spcPct val="150000"/>
+              </a:lnSpc>
+              <a:buFont typeface="Arial" pitchFamily="34" charset="0"/>
+              <a:buChar char="•"/>
+              <a:tabLst>
+                <a:tab pos="363538" algn="l"/>
+              </a:tabLst>
+            </a:pPr>
+            <a:r>
+              <a:rPr lang="de-DE" sz="1800" dirty="0">
+                <a:solidFill>
+                  <a:schemeClr val="tx1">
+                    <a:lumMod val="50000"/>
+                    <a:lumOff val="50000"/>
+                  </a:schemeClr>
+                </a:solidFill>
+                <a:latin typeface="Verdana" pitchFamily="34" charset="0"/>
+                <a:ea typeface="Verdana" pitchFamily="34" charset="0"/>
+                <a:cs typeface="Verdana" pitchFamily="34" charset="0"/>
+              </a:rPr>
+              <a:t>Google Group: </a:t>
+            </a:r>
+            <a:r>
+              <a:rPr lang="de-DE" sz="1800" dirty="0">
+                <a:solidFill>
+                  <a:schemeClr val="tx1">
+                    <a:lumMod val="50000"/>
+                    <a:lumOff val="50000"/>
+                  </a:schemeClr>
+                </a:solidFill>
+                <a:latin typeface="Verdana" pitchFamily="34" charset="0"/>
+                <a:ea typeface="Verdana" pitchFamily="34" charset="0"/>
+                <a:cs typeface="Verdana" pitchFamily="34" charset="0"/>
+                <a:hlinkClick r:id="rId16"/>
               </a:rPr>
               <a:t>https://groups.google.com/forum/?hl=en#!forum/nmrml/join</a:t>
             </a:r>
@@ -6330,7 +6466,7 @@
           <p:nvPr/>
         </p:nvPicPr>
         <p:blipFill>
-          <a:blip r:embed="rId16">
+          <a:blip r:embed="rId17">
             <a:extLst>
               <a:ext uri="{28A0092B-C50C-407E-A947-70E740481C1C}">
                 <a14:useLocalDpi xmlns:a14="http://schemas.microsoft.com/office/drawing/2010/main" val="0"/>
@@ -6742,13 +6878,13 @@
             </a:r>
             <a:r>
               <a:rPr lang="en-US" sz="1200" dirty="0">
-                <a:hlinkClick r:id="rId17" action="ppaction://hlinkfile"/>
+                <a:hlinkClick r:id="rId18" action="ppaction://hlinkfile"/>
               </a:rPr>
               <a:t>file:///Users/mike/Projects/nmrML/nmrML/examples/IPB_HopExample/FIDs/FAM013</a:t>
             </a:r>
             <a:r>
               <a:rPr lang="en-US" sz="1200" dirty="0" smtClean="0">
-                <a:hlinkClick r:id="rId17" action="ppaction://hlinkfile"/>
+                <a:hlinkClick r:id="rId18" action="ppaction://hlinkfile"/>
               </a:rPr>
               <a:t>_ </a:t>
             </a:r>
@@ -6758,13 +6894,13 @@
             </a:r>
             <a:r>
               <a:rPr lang="en-US" sz="1200" dirty="0" smtClean="0">
-                <a:hlinkClick r:id="rId17" action="ppaction://hlinkfile"/>
+                <a:hlinkClick r:id="rId18" action="ppaction://hlinkfile"/>
               </a:rPr>
               <a:t>AHTM.PROTON_04.fid/</a:t>
             </a:r>
             <a:r>
               <a:rPr lang="en-US" sz="1200" dirty="0" err="1" smtClean="0">
-                <a:hlinkClick r:id="rId17" action="ppaction://hlinkfile"/>
+                <a:hlinkClick r:id="rId18" action="ppaction://hlinkfile"/>
               </a:rPr>
               <a:t>procpar</a:t>
             </a:r>
@@ -6867,7 +7003,7 @@
             </a:r>
             <a:r>
               <a:rPr lang="en-US" sz="1200" dirty="0">
-                <a:hlinkClick r:id="rId18" action="ppaction://hlinkfile"/>
+                <a:hlinkClick r:id="rId19" action="ppaction://hlinkfile"/>
               </a:rPr>
               <a:t>file:///Users/mike/Projects/nmrML/nmrML/examples/IPB_HopExample/FIDs/FAM013_AHTM.PROTON_04.fid/fid</a:t>
             </a:r>
@@ -7606,7 +7742,7 @@
           <p:nvPr/>
         </p:nvPicPr>
         <p:blipFill>
-          <a:blip r:embed="rId19">
+          <a:blip r:embed="rId20">
             <a:extLst>
               <a:ext uri="{28A0092B-C50C-407E-A947-70E740481C1C}">
                 <a14:useLocalDpi xmlns:a14="http://schemas.microsoft.com/office/drawing/2010/main" val="0"/>
@@ -7636,7 +7772,7 @@
           <p:nvPr/>
         </p:nvPicPr>
         <p:blipFill>
-          <a:blip r:embed="rId20">
+          <a:blip r:embed="rId21">
             <a:extLst>
               <a:ext uri="{28A0092B-C50C-407E-A947-70E740481C1C}">
                 <a14:useLocalDpi xmlns:a14="http://schemas.microsoft.com/office/drawing/2010/main" val="0"/>
@@ -7666,7 +7802,7 @@
           <p:nvPr/>
         </p:nvPicPr>
         <p:blipFill>
-          <a:blip r:embed="rId21">
+          <a:blip r:embed="rId22">
             <a:extLst>
               <a:ext uri="{28A0092B-C50C-407E-A947-70E740481C1C}">
                 <a14:useLocalDpi xmlns:a14="http://schemas.microsoft.com/office/drawing/2010/main" val="0"/>
@@ -7679,7 +7815,7 @@
         </p:blipFill>
         <p:spPr>
           <a:xfrm>
-            <a:off x="17049750" y="29883030"/>
+            <a:off x="17132728" y="29915447"/>
             <a:ext cx="12076167" cy="4923266"/>
           </a:xfrm>
           <a:prstGeom prst="rect">
@@ -7705,12 +7841,12 @@
           <a:graphicData uri="http://schemas.openxmlformats.org/presentationml/2006/ole">
             <mc:AlternateContent xmlns:mc="http://schemas.openxmlformats.org/markup-compatibility/2006">
               <mc:Choice xmlns:v="urn:schemas-microsoft-com:vml" Requires="v">
-                <p:oleObj spid="_x0000_s3088" r:id="rId22" imgW="155999880" imgH="75692160" progId="">
+                <p:oleObj spid="_x0000_s3101" r:id="rId23" imgW="155999880" imgH="75692160" progId="">
                   <p:embed/>
                 </p:oleObj>
               </mc:Choice>
               <mc:Fallback>
-                <p:oleObj r:id="rId22" imgW="155999880" imgH="75692160" progId="">
+                <p:oleObj r:id="rId23" imgW="155999880" imgH="75692160" progId="">
                   <p:embed/>
                   <p:pic>
                     <p:nvPicPr>
@@ -7719,7 +7855,7 @@
                       <p:nvPr/>
                     </p:nvPicPr>
                     <p:blipFill>
-                      <a:blip r:embed="rId23"/>
+                      <a:blip r:embed="rId24"/>
                       <a:stretch>
                         <a:fillRect/>
                       </a:stretch>
@@ -7749,7 +7885,7 @@
           <p:nvPr/>
         </p:nvPicPr>
         <p:blipFill>
-          <a:blip r:embed="rId24" cstate="email">
+          <a:blip r:embed="rId25" cstate="email">
             <a:extLst>
               <a:ext uri="{28A0092B-C50C-407E-A947-70E740481C1C}">
                 <a14:useLocalDpi xmlns:a14="http://schemas.microsoft.com/office/drawing/2010/main" val="0"/>
@@ -7819,7 +7955,7 @@
           <p:nvPr/>
         </p:nvPicPr>
         <p:blipFill>
-          <a:blip r:embed="rId25" cstate="email">
+          <a:blip r:embed="rId26" cstate="email">
             <a:extLst>
               <a:ext uri="{28A0092B-C50C-407E-A947-70E740481C1C}">
                 <a14:useLocalDpi xmlns:a14="http://schemas.microsoft.com/office/drawing/2010/main" val="0"/>
@@ -8003,27 +8139,7 @@
                 <a:latin typeface="Verdana"/>
                 <a:cs typeface="Verdana"/>
               </a:rPr>
-              <a:t> like the Core Information for Metabolomics Reporting (</a:t>
-            </a:r>
-            <a:r>
-              <a:rPr lang="en-US" sz="2800" dirty="0" smtClean="0">
-                <a:solidFill>
-                  <a:srgbClr val="121421"/>
-                </a:solidFill>
-                <a:latin typeface="Verdana"/>
-                <a:cs typeface="Verdana"/>
-              </a:rPr>
-              <a:t>CIMR) </a:t>
-            </a:r>
-            <a:r>
-              <a:rPr lang="en-US" sz="2800" dirty="0" smtClean="0">
-                <a:solidFill>
-                  <a:srgbClr val="121421"/>
-                </a:solidFill>
-                <a:latin typeface="Verdana"/>
-                <a:cs typeface="Verdana"/>
-              </a:rPr>
-              <a:t>are met.</a:t>
+              <a:t> like the Core Information for Metabolomics Reporting (CIMR) are met.</a:t>
             </a:r>
             <a:endParaRPr lang="ro-RO" sz="2800" dirty="0">
               <a:solidFill>
@@ -8276,7 +8392,7 @@
               </a:tabLst>
             </a:pPr>
             <a:r>
-              <a:rPr lang="en-US" sz="1400" dirty="0" err="1">
+              <a:rPr lang="en-US" sz="1400" dirty="0" err="1" smtClean="0">
                 <a:solidFill>
                   <a:schemeClr val="tx1">
                     <a:lumMod val="50000"/>
@@ -8287,7 +8403,7 @@
                 <a:ea typeface="Verdana" pitchFamily="34" charset="0"/>
                 <a:cs typeface="Verdana" pitchFamily="34" charset="0"/>
               </a:rPr>
-              <a:t>Metabolights</a:t>
+              <a:t>MetaboLights</a:t>
             </a:r>
             <a:r>
               <a:rPr lang="en-US" sz="1400" dirty="0">
@@ -8314,7 +8430,7 @@
                 <a:latin typeface="Verdana" pitchFamily="34" charset="0"/>
                 <a:ea typeface="Verdana" pitchFamily="34" charset="0"/>
                 <a:cs typeface="Verdana" pitchFamily="34" charset="0"/>
-                <a:hlinkClick r:id="rId26"/>
+                <a:hlinkClick r:id="rId27"/>
               </a:rPr>
               <a:t>http://www.ebi.ac.uk/metabolights/</a:t>
             </a:r>
@@ -8369,7 +8485,7 @@
                 <a:latin typeface="Verdana" pitchFamily="34" charset="0"/>
                 <a:ea typeface="Verdana" pitchFamily="34" charset="0"/>
                 <a:cs typeface="Verdana" pitchFamily="34" charset="0"/>
-                <a:hlinkClick r:id="rId27"/>
+                <a:hlinkClick r:id="rId28"/>
               </a:rPr>
               <a:t>http://msi-workgroups.sourceforge.net/</a:t>
             </a:r>
@@ -8424,7 +8540,7 @@
                 <a:latin typeface="Verdana" pitchFamily="34" charset="0"/>
                 <a:ea typeface="Verdana" pitchFamily="34" charset="0"/>
                 <a:cs typeface="Verdana" pitchFamily="34" charset="0"/>
-                <a:hlinkClick r:id="rId28"/>
+                <a:hlinkClick r:id="rId29"/>
               </a:rPr>
               <a:t>http://mibbi.sourceforge.net/projects/CIMR.shtml</a:t>
             </a:r>
@@ -8509,7 +8625,7 @@
           <p:nvPr/>
         </p:nvPicPr>
         <p:blipFill>
-          <a:blip r:embed="rId29">
+          <a:blip r:embed="rId30">
             <a:extLst>
               <a:ext uri="{28A0092B-C50C-407E-A947-70E740481C1C}">
                 <a14:useLocalDpi xmlns:a14="http://schemas.microsoft.com/office/drawing/2010/main" val="0"/>
@@ -8522,7 +8638,7 @@
         </p:blipFill>
         <p:spPr>
           <a:xfrm>
-            <a:off x="1216698" y="29984314"/>
+            <a:off x="1326464" y="29874853"/>
             <a:ext cx="7184352" cy="4826987"/>
           </a:xfrm>
           <a:prstGeom prst="rect">
@@ -8661,7 +8777,7 @@
           <p:nvPr/>
         </p:nvPicPr>
         <p:blipFill>
-          <a:blip r:embed="rId30">
+          <a:blip r:embed="rId31">
             <a:extLst>
               <a:ext uri="{28A0092B-C50C-407E-A947-70E740481C1C}">
                 <a14:useLocalDpi xmlns:a14="http://schemas.microsoft.com/office/drawing/2010/main" val="0"/>
@@ -8782,9 +8898,9 @@
           <p:nvPr/>
         </p:nvSpPr>
         <p:spPr>
-          <a:xfrm>
-            <a:off x="7057054" y="32337575"/>
-            <a:ext cx="2459392" cy="367025"/>
+          <a:xfrm rot="1237141">
+            <a:off x="7266297" y="32245313"/>
+            <a:ext cx="2512940" cy="296192"/>
           </a:xfrm>
           <a:prstGeom prst="rightArrow">
             <a:avLst/>
@@ -8819,6 +8935,94 @@
           </a:p>
         </p:txBody>
       </p:sp>
+      <p:sp>
+        <p:nvSpPr>
+          <p:cNvPr id="56" name="Pfeil nach rechts 55"/>
+          <p:cNvSpPr/>
+          <p:nvPr/>
+        </p:nvSpPr>
+        <p:spPr>
+          <a:xfrm rot="1779196">
+            <a:off x="15711416" y="34549054"/>
+            <a:ext cx="1892419" cy="299448"/>
+          </a:xfrm>
+          <a:prstGeom prst="rightArrow">
+            <a:avLst/>
+          </a:prstGeom>
+          <a:solidFill>
+            <a:schemeClr val="tx2">
+              <a:lumMod val="20000"/>
+              <a:lumOff val="80000"/>
+            </a:schemeClr>
+          </a:solidFill>
+        </p:spPr>
+        <p:style>
+          <a:lnRef idx="1">
+            <a:schemeClr val="accent5"/>
+          </a:lnRef>
+          <a:fillRef idx="3">
+            <a:schemeClr val="accent5"/>
+          </a:fillRef>
+          <a:effectRef idx="2">
+            <a:schemeClr val="accent5"/>
+          </a:effectRef>
+          <a:fontRef idx="minor">
+            <a:schemeClr val="lt1"/>
+          </a:fontRef>
+        </p:style>
+        <p:txBody>
+          <a:bodyPr rtlCol="0" anchor="ctr"/>
+          <a:lstStyle/>
+          <a:p>
+            <a:pPr algn="ctr"/>
+            <a:endParaRPr lang="en-US"/>
+          </a:p>
+        </p:txBody>
+      </p:sp>
+      <p:sp>
+        <p:nvSpPr>
+          <p:cNvPr id="57" name="Pfeil nach rechts 56"/>
+          <p:cNvSpPr/>
+          <p:nvPr/>
+        </p:nvSpPr>
+        <p:spPr>
+          <a:xfrm rot="941494">
+            <a:off x="5383456" y="31745619"/>
+            <a:ext cx="11726285" cy="359839"/>
+          </a:xfrm>
+          <a:prstGeom prst="rightArrow">
+            <a:avLst/>
+          </a:prstGeom>
+          <a:solidFill>
+            <a:schemeClr val="tx2">
+              <a:lumMod val="20000"/>
+              <a:lumOff val="80000"/>
+            </a:schemeClr>
+          </a:solidFill>
+        </p:spPr>
+        <p:style>
+          <a:lnRef idx="1">
+            <a:schemeClr val="accent5"/>
+          </a:lnRef>
+          <a:fillRef idx="3">
+            <a:schemeClr val="accent5"/>
+          </a:fillRef>
+          <a:effectRef idx="2">
+            <a:schemeClr val="accent5"/>
+          </a:effectRef>
+          <a:fontRef idx="minor">
+            <a:schemeClr val="lt1"/>
+          </a:fontRef>
+        </p:style>
+        <p:txBody>
+          <a:bodyPr rtlCol="0" anchor="ctr"/>
+          <a:lstStyle/>
+          <a:p>
+            <a:pPr algn="ctr"/>
+            <a:endParaRPr lang="en-US"/>
+          </a:p>
+        </p:txBody>
+      </p:sp>
     </p:spTree>
     <p:extLst>
       <p:ext uri="{BB962C8B-B14F-4D97-AF65-F5344CB8AC3E}">
@@ -8836,6 +9040,1013 @@
       </p:par>
     </p:tnLst>
   </p:timing>
+</p:sld>
+</file>
+
+<file path=ppt/slides/slide2.xml><?xml version="1.0" encoding="utf-8"?>
+<p:sld xmlns:a="http://schemas.openxmlformats.org/drawingml/2006/main" xmlns:r="http://schemas.openxmlformats.org/officeDocument/2006/relationships" xmlns:p="http://schemas.openxmlformats.org/presentationml/2006/main">
+  <p:cSld>
+    <p:spTree>
+      <p:nvGrpSpPr>
+        <p:cNvPr id="1" name=""/>
+        <p:cNvGrpSpPr/>
+        <p:nvPr/>
+      </p:nvGrpSpPr>
+      <p:grpSpPr>
+        <a:xfrm>
+          <a:off x="0" y="0"/>
+          <a:ext cx="0" cy="0"/>
+          <a:chOff x="0" y="0"/>
+          <a:chExt cx="0" cy="0"/>
+        </a:xfrm>
+      </p:grpSpPr>
+      <p:sp>
+        <p:nvSpPr>
+          <p:cNvPr id="2" name="Titel 1"/>
+          <p:cNvSpPr>
+            <a:spLocks noGrp="1"/>
+          </p:cNvSpPr>
+          <p:nvPr>
+            <p:ph type="title"/>
+          </p:nvPr>
+        </p:nvSpPr>
+        <p:spPr/>
+        <p:txBody>
+          <a:bodyPr>
+            <a:normAutofit/>
+          </a:bodyPr>
+          <a:lstStyle/>
+          <a:p>
+            <a:r>
+              <a:rPr lang="de-DE" sz="4800" dirty="0" smtClean="0"/>
+              <a:t>XSD </a:t>
+            </a:r>
+            <a:r>
+              <a:rPr lang="de-DE" sz="4800" dirty="0" err="1" smtClean="0"/>
+              <a:t>based</a:t>
+            </a:r>
+            <a:r>
+              <a:rPr lang="de-DE" sz="4800" dirty="0" smtClean="0"/>
+              <a:t> </a:t>
+            </a:r>
+            <a:r>
+              <a:rPr lang="de-DE" sz="4800" dirty="0" err="1" smtClean="0"/>
+              <a:t>validation</a:t>
+            </a:r>
+            <a:r>
+              <a:rPr lang="de-DE" sz="4800" dirty="0" smtClean="0"/>
+              <a:t/>
+            </a:r>
+            <a:br>
+              <a:rPr lang="de-DE" sz="4800" dirty="0" smtClean="0"/>
+            </a:br>
+            <a:r>
+              <a:rPr lang="de-DE" sz="4800" dirty="0" err="1" smtClean="0"/>
+              <a:t>Example</a:t>
+            </a:r>
+            <a:endParaRPr lang="en-US" sz="4800" dirty="0"/>
+          </a:p>
+        </p:txBody>
+      </p:sp>
+      <p:sp>
+        <p:nvSpPr>
+          <p:cNvPr id="3" name="Inhaltsplatzhalter 2"/>
+          <p:cNvSpPr>
+            <a:spLocks noGrp="1"/>
+          </p:cNvSpPr>
+          <p:nvPr>
+            <p:ph idx="1"/>
+          </p:nvPr>
+        </p:nvSpPr>
+        <p:spPr/>
+        <p:txBody>
+          <a:bodyPr>
+            <a:normAutofit/>
+          </a:bodyPr>
+          <a:lstStyle/>
+          <a:p>
+            <a:pPr marL="0" indent="0">
+              <a:buNone/>
+            </a:pPr>
+            <a:r>
+              <a:rPr lang="de-DE" sz="3200" dirty="0" err="1" smtClean="0">
+                <a:solidFill>
+                  <a:schemeClr val="accent4"/>
+                </a:solidFill>
+              </a:rPr>
+              <a:t>SourceFile</a:t>
+            </a:r>
+            <a:r>
+              <a:rPr lang="de-DE" sz="3200" dirty="0" smtClean="0"/>
+              <a:t> </a:t>
+            </a:r>
+            <a:r>
+              <a:rPr lang="de-DE" sz="3200" dirty="0" err="1" smtClean="0"/>
+              <a:t>description</a:t>
+            </a:r>
+            <a:r>
+              <a:rPr lang="de-DE" sz="3200" dirty="0" smtClean="0"/>
+              <a:t> </a:t>
+            </a:r>
+            <a:r>
+              <a:rPr lang="de-DE" sz="3200" dirty="0" err="1" smtClean="0">
+                <a:solidFill>
+                  <a:srgbClr val="FF0000"/>
+                </a:solidFill>
+              </a:rPr>
+              <a:t>requires</a:t>
+            </a:r>
+            <a:r>
+              <a:rPr lang="de-DE" sz="3200" dirty="0" smtClean="0"/>
+              <a:t> a </a:t>
+            </a:r>
+            <a:r>
+              <a:rPr lang="de-DE" sz="3200" dirty="0" err="1" smtClean="0">
+                <a:solidFill>
+                  <a:schemeClr val="accent1"/>
+                </a:solidFill>
+              </a:rPr>
+              <a:t>name</a:t>
+            </a:r>
+            <a:r>
+              <a:rPr lang="de-DE" sz="3200" dirty="0" smtClean="0"/>
+              <a:t> </a:t>
+            </a:r>
+            <a:r>
+              <a:rPr lang="de-DE" sz="3200" dirty="0" err="1" smtClean="0"/>
+              <a:t>to</a:t>
+            </a:r>
+            <a:r>
+              <a:rPr lang="de-DE" sz="3200" dirty="0" smtClean="0"/>
+              <a:t> </a:t>
+            </a:r>
+            <a:r>
+              <a:rPr lang="de-DE" sz="3200" dirty="0" err="1" smtClean="0"/>
+              <a:t>be</a:t>
+            </a:r>
+            <a:r>
+              <a:rPr lang="de-DE" sz="3200" dirty="0" smtClean="0"/>
+              <a:t> </a:t>
+            </a:r>
+            <a:r>
+              <a:rPr lang="de-DE" sz="3200" dirty="0" err="1" smtClean="0"/>
+              <a:t>specified</a:t>
+            </a:r>
+            <a:r>
+              <a:rPr lang="de-DE" sz="3200" dirty="0" smtClean="0"/>
+              <a:t>:</a:t>
+            </a:r>
+          </a:p>
+          <a:p>
+            <a:pPr marL="0" indent="0">
+              <a:buNone/>
+            </a:pPr>
+            <a:endParaRPr lang="en-US" sz="3200" dirty="0" smtClean="0"/>
+          </a:p>
+          <a:p>
+            <a:pPr marL="0" indent="0">
+              <a:buNone/>
+            </a:pPr>
+            <a:r>
+              <a:rPr lang="en-US" sz="3200" dirty="0" smtClean="0"/>
+              <a:t> </a:t>
+            </a:r>
+            <a:r>
+              <a:rPr lang="en-US" sz="3200" dirty="0"/>
+              <a:t>&lt;</a:t>
+            </a:r>
+            <a:r>
+              <a:rPr lang="en-US" sz="3200" dirty="0" err="1"/>
+              <a:t>xs:complexType</a:t>
+            </a:r>
+            <a:r>
+              <a:rPr lang="en-US" sz="3200" dirty="0"/>
+              <a:t> name="</a:t>
+            </a:r>
+            <a:r>
+              <a:rPr lang="en-US" sz="3200" dirty="0" err="1">
+                <a:solidFill>
+                  <a:schemeClr val="accent4"/>
+                </a:solidFill>
+              </a:rPr>
+              <a:t>SourceFileType</a:t>
+            </a:r>
+            <a:r>
+              <a:rPr lang="en-US" sz="3200" dirty="0"/>
+              <a:t>"&gt;</a:t>
+            </a:r>
+            <a:br>
+              <a:rPr lang="en-US" sz="3200" dirty="0"/>
+            </a:br>
+            <a:r>
+              <a:rPr lang="en-US" sz="3200" dirty="0"/>
+              <a:t>    &lt;</a:t>
+            </a:r>
+            <a:r>
+              <a:rPr lang="en-US" sz="3200" dirty="0" err="1"/>
+              <a:t>xs:annotation</a:t>
+            </a:r>
+            <a:r>
+              <a:rPr lang="en-US" sz="3200" dirty="0" smtClean="0"/>
+              <a:t>&gt; &lt;</a:t>
+            </a:r>
+            <a:r>
+              <a:rPr lang="en-US" sz="3200" dirty="0" err="1" smtClean="0"/>
+              <a:t>xs:documentation</a:t>
+            </a:r>
+            <a:r>
+              <a:rPr lang="en-US" sz="3200" dirty="0" smtClean="0"/>
+              <a:t>&gt;It could </a:t>
+            </a:r>
+            <a:r>
+              <a:rPr lang="en-US" sz="3200" dirty="0"/>
+              <a:t>point to an FID file, a </a:t>
+            </a:r>
+            <a:r>
+              <a:rPr lang="en-US" sz="3200" dirty="0" err="1" smtClean="0"/>
+              <a:t>procpar</a:t>
+            </a:r>
+            <a:r>
+              <a:rPr lang="en-US" sz="3200" dirty="0" smtClean="0"/>
+              <a:t> file.&lt;/</a:t>
+            </a:r>
+            <a:r>
+              <a:rPr lang="en-US" sz="3200" dirty="0" err="1"/>
+              <a:t>xs:documentation</a:t>
+            </a:r>
+            <a:r>
+              <a:rPr lang="en-US" sz="3200" dirty="0" smtClean="0"/>
+              <a:t>&gt;  </a:t>
+            </a:r>
+            <a:r>
+              <a:rPr lang="en-US" sz="3200" dirty="0"/>
+              <a:t>&lt;/</a:t>
+            </a:r>
+            <a:r>
+              <a:rPr lang="en-US" sz="3200" dirty="0" err="1"/>
+              <a:t>xs:annotation</a:t>
+            </a:r>
+            <a:r>
+              <a:rPr lang="en-US" sz="3200" dirty="0" smtClean="0"/>
+              <a:t>&gt; […]</a:t>
+            </a:r>
+            <a:r>
+              <a:rPr lang="en-US" sz="3200" dirty="0"/>
+              <a:t/>
+            </a:r>
+            <a:br>
+              <a:rPr lang="en-US" sz="3200" dirty="0"/>
+            </a:br>
+            <a:r>
+              <a:rPr lang="en-US" sz="3200" dirty="0" smtClean="0"/>
+              <a:t>        </a:t>
+            </a:r>
+            <a:r>
+              <a:rPr lang="en-US" sz="3200" dirty="0"/>
+              <a:t>&lt;</a:t>
+            </a:r>
+            <a:r>
+              <a:rPr lang="en-US" sz="3200" dirty="0" err="1"/>
+              <a:t>xs:attribute</a:t>
+            </a:r>
+            <a:r>
+              <a:rPr lang="en-US" sz="3200" dirty="0"/>
+              <a:t> name="</a:t>
+            </a:r>
+            <a:r>
+              <a:rPr lang="en-US" sz="3200" dirty="0">
+                <a:solidFill>
+                  <a:schemeClr val="accent1"/>
+                </a:solidFill>
+              </a:rPr>
+              <a:t>name</a:t>
+            </a:r>
+            <a:r>
+              <a:rPr lang="en-US" sz="3200" dirty="0"/>
+              <a:t>" type="</a:t>
+            </a:r>
+            <a:r>
+              <a:rPr lang="en-US" sz="3200" dirty="0" err="1"/>
+              <a:t>xs:string</a:t>
+            </a:r>
+            <a:r>
+              <a:rPr lang="en-US" sz="3200" dirty="0"/>
+              <a:t>" </a:t>
+            </a:r>
+            <a:r>
+              <a:rPr lang="en-US" sz="3200" dirty="0">
+                <a:solidFill>
+                  <a:srgbClr val="FF0000"/>
+                </a:solidFill>
+              </a:rPr>
+              <a:t>use="required"</a:t>
+            </a:r>
+            <a:r>
+              <a:rPr lang="en-US" sz="3200" dirty="0"/>
+              <a:t>&gt;</a:t>
+            </a:r>
+            <a:br>
+              <a:rPr lang="en-US" sz="3200" dirty="0"/>
+            </a:br>
+            <a:r>
+              <a:rPr lang="en-US" sz="3200" dirty="0"/>
+              <a:t>          &lt;</a:t>
+            </a:r>
+            <a:r>
+              <a:rPr lang="en-US" sz="3200" dirty="0" err="1"/>
+              <a:t>xs:annotation</a:t>
+            </a:r>
+            <a:r>
+              <a:rPr lang="en-US" sz="3200" dirty="0" smtClean="0"/>
+              <a:t>&gt; &lt;</a:t>
+            </a:r>
+            <a:r>
+              <a:rPr lang="en-US" sz="3200" dirty="0" err="1"/>
+              <a:t>xs:documentation</a:t>
+            </a:r>
+            <a:r>
+              <a:rPr lang="en-US" sz="3200" dirty="0"/>
+              <a:t>&gt;Name of the source file, without reference to location (either URI </a:t>
+            </a:r>
+            <a:r>
+              <a:rPr lang="en-US" sz="3200" dirty="0" smtClean="0"/>
+              <a:t>or </a:t>
+            </a:r>
+            <a:r>
+              <a:rPr lang="en-US" sz="3200" dirty="0"/>
+              <a:t>local path).&lt;/</a:t>
+            </a:r>
+            <a:r>
+              <a:rPr lang="en-US" sz="3200" dirty="0" err="1"/>
+              <a:t>xs:documentation</a:t>
+            </a:r>
+            <a:r>
+              <a:rPr lang="en-US" sz="3200" dirty="0" smtClean="0"/>
+              <a:t>&gt; &lt;/</a:t>
+            </a:r>
+            <a:r>
+              <a:rPr lang="en-US" sz="3200" dirty="0" err="1"/>
+              <a:t>xs:annotation</a:t>
+            </a:r>
+            <a:r>
+              <a:rPr lang="en-US" sz="3200" dirty="0"/>
+              <a:t>&gt;</a:t>
+            </a:r>
+            <a:br>
+              <a:rPr lang="en-US" sz="3200" dirty="0"/>
+            </a:br>
+            <a:r>
+              <a:rPr lang="en-US" sz="3200" dirty="0"/>
+              <a:t>        &lt;/</a:t>
+            </a:r>
+            <a:r>
+              <a:rPr lang="en-US" sz="3200" dirty="0" err="1"/>
+              <a:t>xs:attribute</a:t>
+            </a:r>
+            <a:r>
+              <a:rPr lang="en-US" sz="3200" dirty="0" smtClean="0"/>
+              <a:t>&gt; […]</a:t>
+            </a:r>
+            <a:r>
+              <a:rPr lang="en-US" sz="3200" dirty="0"/>
+              <a:t/>
+            </a:r>
+            <a:br>
+              <a:rPr lang="en-US" sz="3200" dirty="0"/>
+            </a:br>
+            <a:r>
+              <a:rPr lang="en-US" sz="3200" dirty="0"/>
+              <a:t>  &lt;/</a:t>
+            </a:r>
+            <a:r>
+              <a:rPr lang="en-US" sz="3200" dirty="0" err="1"/>
+              <a:t>xs:complexType</a:t>
+            </a:r>
+            <a:r>
+              <a:rPr lang="en-US" sz="3200" dirty="0"/>
+              <a:t>&gt;</a:t>
+            </a:r>
+            <a:endParaRPr lang="en-US" sz="3200" dirty="0"/>
+          </a:p>
+        </p:txBody>
+      </p:sp>
+    </p:spTree>
+    <p:extLst>
+      <p:ext uri="{BB962C8B-B14F-4D97-AF65-F5344CB8AC3E}">
+        <p14:creationId xmlns:p14="http://schemas.microsoft.com/office/powerpoint/2010/main" val="607307610"/>
+      </p:ext>
+    </p:extLst>
+  </p:cSld>
+  <p:clrMapOvr>
+    <a:masterClrMapping/>
+  </p:clrMapOvr>
+</p:sld>
+</file>
+
+<file path=ppt/slides/slide3.xml><?xml version="1.0" encoding="utf-8"?>
+<p:sld xmlns:a="http://schemas.openxmlformats.org/drawingml/2006/main" xmlns:r="http://schemas.openxmlformats.org/officeDocument/2006/relationships" xmlns:p="http://schemas.openxmlformats.org/presentationml/2006/main">
+  <p:cSld>
+    <p:spTree>
+      <p:nvGrpSpPr>
+        <p:cNvPr id="1" name=""/>
+        <p:cNvGrpSpPr/>
+        <p:nvPr/>
+      </p:nvGrpSpPr>
+      <p:grpSpPr>
+        <a:xfrm>
+          <a:off x="0" y="0"/>
+          <a:ext cx="0" cy="0"/>
+          <a:chOff x="0" y="0"/>
+          <a:chExt cx="0" cy="0"/>
+        </a:xfrm>
+      </p:grpSpPr>
+      <p:sp>
+        <p:nvSpPr>
+          <p:cNvPr id="2" name="Titel 1"/>
+          <p:cNvSpPr>
+            <a:spLocks noGrp="1"/>
+          </p:cNvSpPr>
+          <p:nvPr>
+            <p:ph type="title"/>
+          </p:nvPr>
+        </p:nvSpPr>
+        <p:spPr/>
+        <p:txBody>
+          <a:bodyPr>
+            <a:normAutofit/>
+          </a:bodyPr>
+          <a:lstStyle/>
+          <a:p>
+            <a:r>
+              <a:rPr lang="de-DE" sz="4800" dirty="0" err="1" smtClean="0"/>
+              <a:t>Rule</a:t>
+            </a:r>
+            <a:r>
+              <a:rPr lang="de-DE" sz="4800" dirty="0" smtClean="0"/>
+              <a:t> </a:t>
+            </a:r>
+            <a:r>
+              <a:rPr lang="de-DE" sz="4800" dirty="0" err="1"/>
+              <a:t>based</a:t>
+            </a:r>
+            <a:r>
+              <a:rPr lang="de-DE" sz="4800" dirty="0"/>
+              <a:t> </a:t>
+            </a:r>
+            <a:r>
+              <a:rPr lang="de-DE" sz="4800" dirty="0" smtClean="0"/>
+              <a:t>CV </a:t>
+            </a:r>
+            <a:r>
+              <a:rPr lang="de-DE" sz="4800" dirty="0" err="1" smtClean="0"/>
+              <a:t>usage</a:t>
+            </a:r>
+            <a:r>
+              <a:rPr lang="de-DE" sz="4800" dirty="0" smtClean="0"/>
+              <a:t> </a:t>
+            </a:r>
+            <a:r>
+              <a:rPr lang="de-DE" sz="4800" dirty="0" err="1" smtClean="0"/>
+              <a:t>validation</a:t>
+            </a:r>
+            <a:r>
+              <a:rPr lang="de-DE" sz="4800" dirty="0"/>
+              <a:t/>
+            </a:r>
+            <a:br>
+              <a:rPr lang="de-DE" sz="4800" dirty="0"/>
+            </a:br>
+            <a:r>
+              <a:rPr lang="de-DE" sz="4800" dirty="0" err="1"/>
+              <a:t>Example</a:t>
+            </a:r>
+            <a:endParaRPr lang="en-US" sz="4800" dirty="0"/>
+          </a:p>
+        </p:txBody>
+      </p:sp>
+      <p:sp>
+        <p:nvSpPr>
+          <p:cNvPr id="3" name="Inhaltsplatzhalter 2"/>
+          <p:cNvSpPr>
+            <a:spLocks noGrp="1"/>
+          </p:cNvSpPr>
+          <p:nvPr>
+            <p:ph idx="1"/>
+          </p:nvPr>
+        </p:nvSpPr>
+        <p:spPr/>
+        <p:txBody>
+          <a:bodyPr>
+            <a:normAutofit/>
+          </a:bodyPr>
+          <a:lstStyle/>
+          <a:p>
+            <a:pPr marL="0" indent="0">
+              <a:buNone/>
+            </a:pPr>
+            <a:r>
+              <a:rPr lang="de-DE" sz="3200" dirty="0" err="1" smtClean="0"/>
+              <a:t>For</a:t>
+            </a:r>
+            <a:r>
+              <a:rPr lang="de-DE" sz="3200" dirty="0" smtClean="0"/>
+              <a:t> </a:t>
+            </a:r>
+            <a:r>
+              <a:rPr lang="de-DE" sz="3200" dirty="0" err="1" smtClean="0"/>
+              <a:t>the</a:t>
+            </a:r>
+            <a:r>
+              <a:rPr lang="de-DE" sz="3200" dirty="0" smtClean="0"/>
+              <a:t> </a:t>
+            </a:r>
+            <a:r>
+              <a:rPr lang="de-DE" sz="3200" dirty="0" smtClean="0">
+                <a:solidFill>
+                  <a:schemeClr val="accent4"/>
+                </a:solidFill>
+              </a:rPr>
+              <a:t>Instrument </a:t>
+            </a:r>
+            <a:r>
+              <a:rPr lang="de-DE" sz="3200" dirty="0" err="1" smtClean="0">
+                <a:solidFill>
+                  <a:schemeClr val="accent4"/>
+                </a:solidFill>
+              </a:rPr>
+              <a:t>configuration</a:t>
+            </a:r>
+            <a:r>
+              <a:rPr lang="de-DE" sz="3200" dirty="0" smtClean="0"/>
+              <a:t>, </a:t>
+            </a:r>
+            <a:r>
+              <a:rPr lang="de-DE" sz="3200" dirty="0" err="1" smtClean="0"/>
+              <a:t>the</a:t>
+            </a:r>
+            <a:r>
+              <a:rPr lang="de-DE" sz="3200" dirty="0" smtClean="0"/>
+              <a:t> </a:t>
+            </a:r>
+            <a:r>
+              <a:rPr lang="de-DE" sz="3200" dirty="0" err="1" smtClean="0"/>
+              <a:t>mapping</a:t>
+            </a:r>
+            <a:r>
+              <a:rPr lang="de-DE" sz="3200" dirty="0" smtClean="0"/>
+              <a:t> </a:t>
+            </a:r>
+            <a:r>
+              <a:rPr lang="de-DE" sz="3200" dirty="0" err="1" smtClean="0"/>
+              <a:t>rule</a:t>
+            </a:r>
+            <a:r>
+              <a:rPr lang="de-DE" sz="3200" dirty="0" smtClean="0"/>
+              <a:t> </a:t>
+            </a:r>
+            <a:r>
+              <a:rPr lang="de-DE" sz="3200" dirty="0" err="1" smtClean="0"/>
+              <a:t>file</a:t>
+            </a:r>
+            <a:r>
+              <a:rPr lang="de-DE" sz="3200" dirty="0"/>
+              <a:t> </a:t>
+            </a:r>
+            <a:r>
+              <a:rPr lang="de-DE" sz="3200" dirty="0" err="1" smtClean="0"/>
+              <a:t>enforces</a:t>
+            </a:r>
+            <a:r>
+              <a:rPr lang="de-DE" sz="3200" dirty="0" smtClean="0"/>
+              <a:t> (</a:t>
+            </a:r>
+            <a:r>
+              <a:rPr lang="de-DE" sz="3200" dirty="0" smtClean="0">
+                <a:solidFill>
+                  <a:srgbClr val="FF0000"/>
+                </a:solidFill>
+              </a:rPr>
+              <a:t>must</a:t>
+            </a:r>
+            <a:r>
+              <a:rPr lang="de-DE" sz="3200" dirty="0" smtClean="0"/>
+              <a:t>) a </a:t>
+            </a:r>
+            <a:r>
+              <a:rPr lang="de-DE" sz="3200" dirty="0" smtClean="0">
+                <a:solidFill>
+                  <a:schemeClr val="accent1"/>
+                </a:solidFill>
+              </a:rPr>
+              <a:t>NMR probe </a:t>
+            </a:r>
+            <a:r>
+              <a:rPr lang="de-DE" sz="3200" dirty="0" err="1" smtClean="0">
+                <a:solidFill>
+                  <a:srgbClr val="00B050"/>
+                </a:solidFill>
+              </a:rPr>
+              <a:t>subclass</a:t>
+            </a:r>
+            <a:r>
+              <a:rPr lang="de-DE" sz="3200" dirty="0" smtClean="0">
+                <a:solidFill>
+                  <a:schemeClr val="accent1"/>
+                </a:solidFill>
+              </a:rPr>
+              <a:t> </a:t>
+            </a:r>
+            <a:r>
+              <a:rPr lang="de-DE" sz="3200" dirty="0" err="1" smtClean="0"/>
+              <a:t>specification</a:t>
+            </a:r>
+            <a:r>
+              <a:rPr lang="de-DE" sz="3200" dirty="0" smtClean="0"/>
+              <a:t> via an NMR CV </a:t>
+            </a:r>
+            <a:r>
+              <a:rPr lang="de-DE" sz="3200" dirty="0" err="1" smtClean="0"/>
+              <a:t>term</a:t>
+            </a:r>
+            <a:r>
+              <a:rPr lang="de-DE" sz="3200" dirty="0" smtClean="0"/>
+              <a:t>:</a:t>
+            </a:r>
+          </a:p>
+          <a:p>
+            <a:pPr marL="0" indent="0">
+              <a:buNone/>
+            </a:pPr>
+            <a:endParaRPr lang="en-US" sz="3200" dirty="0" smtClean="0"/>
+          </a:p>
+          <a:p>
+            <a:pPr marL="0" indent="0">
+              <a:buNone/>
+            </a:pPr>
+            <a:r>
+              <a:rPr lang="en-US" sz="3200" dirty="0" smtClean="0"/>
+              <a:t>&lt;</a:t>
+            </a:r>
+            <a:r>
+              <a:rPr lang="en-US" sz="3200" dirty="0" err="1"/>
+              <a:t>CvMappingRule</a:t>
+            </a:r>
+            <a:r>
+              <a:rPr lang="en-US" sz="3200" dirty="0"/>
+              <a:t> id="</a:t>
+            </a:r>
+            <a:r>
+              <a:rPr lang="en-US" sz="3200" dirty="0" err="1"/>
+              <a:t>instrumentConfiguration_must</a:t>
+            </a:r>
+            <a:r>
+              <a:rPr lang="en-US" sz="3200" dirty="0"/>
+              <a:t>"</a:t>
+            </a:r>
+            <a:br>
+              <a:rPr lang="en-US" sz="3200" dirty="0"/>
+            </a:br>
+            <a:r>
+              <a:rPr lang="en-US" sz="3200" dirty="0" err="1"/>
+              <a:t>cvElementPath</a:t>
+            </a:r>
+            <a:r>
+              <a:rPr lang="en-US" sz="3200" dirty="0"/>
+              <a:t>="/</a:t>
+            </a:r>
+            <a:r>
+              <a:rPr lang="en-US" sz="3200" dirty="0" err="1"/>
+              <a:t>nmrML</a:t>
+            </a:r>
+            <a:r>
+              <a:rPr lang="en-US" sz="3200" dirty="0"/>
+              <a:t>/</a:t>
+            </a:r>
+            <a:r>
+              <a:rPr lang="en-US" sz="3200" dirty="0" err="1"/>
+              <a:t>instrumentConfigurationList</a:t>
+            </a:r>
+            <a:r>
+              <a:rPr lang="en-US" sz="3200" dirty="0"/>
+              <a:t>/</a:t>
+            </a:r>
+            <a:r>
+              <a:rPr lang="en-US" sz="3200" dirty="0" err="1">
+                <a:solidFill>
+                  <a:schemeClr val="accent4"/>
+                </a:solidFill>
+              </a:rPr>
+              <a:t>instrumentConfiguration</a:t>
+            </a:r>
+            <a:r>
+              <a:rPr lang="en-US" sz="3200" dirty="0">
+                <a:solidFill>
+                  <a:schemeClr val="accent4"/>
+                </a:solidFill>
+              </a:rPr>
+              <a:t>/</a:t>
+            </a:r>
+            <a:r>
+              <a:rPr lang="en-US" sz="3200" dirty="0" err="1">
+                <a:solidFill>
+                  <a:schemeClr val="accent4"/>
+                </a:solidFill>
+              </a:rPr>
+              <a:t>cvParam</a:t>
+            </a:r>
+            <a:r>
+              <a:rPr lang="en-US" sz="3200" dirty="0"/>
+              <a:t>/@accession"</a:t>
+            </a:r>
+            <a:br>
+              <a:rPr lang="en-US" sz="3200" dirty="0"/>
+            </a:br>
+            <a:r>
+              <a:rPr lang="en-US" sz="3200" dirty="0" err="1">
+                <a:solidFill>
+                  <a:srgbClr val="FF0000"/>
+                </a:solidFill>
+              </a:rPr>
+              <a:t>requirementLevel</a:t>
+            </a:r>
+            <a:r>
+              <a:rPr lang="en-US" sz="3200" dirty="0">
+                <a:solidFill>
+                  <a:srgbClr val="FF0000"/>
+                </a:solidFill>
+              </a:rPr>
+              <a:t>="MUST"</a:t>
+            </a:r>
+            <a:br>
+              <a:rPr lang="en-US" sz="3200" dirty="0">
+                <a:solidFill>
+                  <a:srgbClr val="FF0000"/>
+                </a:solidFill>
+              </a:rPr>
+            </a:br>
+            <a:r>
+              <a:rPr lang="en-US" sz="3200" dirty="0" err="1"/>
+              <a:t>scopePath</a:t>
+            </a:r>
+            <a:r>
+              <a:rPr lang="en-US" sz="3200" dirty="0"/>
+              <a:t>="/</a:t>
+            </a:r>
+            <a:r>
+              <a:rPr lang="en-US" sz="3200" dirty="0" err="1"/>
+              <a:t>nmrML</a:t>
+            </a:r>
+            <a:r>
+              <a:rPr lang="en-US" sz="3200" dirty="0"/>
+              <a:t>/</a:t>
+            </a:r>
+            <a:r>
+              <a:rPr lang="en-US" sz="3200" dirty="0" err="1"/>
+              <a:t>instrumentConfigurationList</a:t>
+            </a:r>
+            <a:r>
+              <a:rPr lang="en-US" sz="3200" dirty="0"/>
+              <a:t>/</a:t>
+            </a:r>
+            <a:r>
+              <a:rPr lang="en-US" sz="3200" dirty="0" err="1"/>
+              <a:t>instrumentConfiguration</a:t>
+            </a:r>
+            <a:r>
+              <a:rPr lang="en-US" sz="3200" dirty="0"/>
+              <a:t>/"</a:t>
+            </a:r>
+            <a:br>
+              <a:rPr lang="en-US" sz="3200" dirty="0"/>
+            </a:br>
+            <a:r>
+              <a:rPr lang="en-US" sz="3200" dirty="0" err="1"/>
+              <a:t>cvTermsCombinationLogic</a:t>
+            </a:r>
+            <a:r>
+              <a:rPr lang="en-US" sz="3200" dirty="0"/>
+              <a:t>="AND"&gt;</a:t>
+            </a:r>
+            <a:br>
+              <a:rPr lang="en-US" sz="3200" dirty="0"/>
+            </a:br>
+            <a:r>
+              <a:rPr lang="en-US" sz="3200" dirty="0"/>
+              <a:t>&lt;</a:t>
+            </a:r>
+            <a:r>
+              <a:rPr lang="en-US" sz="3200" dirty="0" err="1"/>
+              <a:t>CvTerm</a:t>
+            </a:r>
+            <a:r>
+              <a:rPr lang="en-US" sz="3200" dirty="0"/>
+              <a:t> </a:t>
+            </a:r>
+            <a:r>
+              <a:rPr lang="en-US" sz="3200" dirty="0" err="1"/>
+              <a:t>termAccession</a:t>
+            </a:r>
+            <a:r>
+              <a:rPr lang="en-US" sz="3200" dirty="0"/>
+              <a:t>="NMR:1400059" </a:t>
+            </a:r>
+            <a:r>
+              <a:rPr lang="en-US" sz="3200" dirty="0" err="1" smtClean="0"/>
+              <a:t>useTerm</a:t>
+            </a:r>
+            <a:r>
+              <a:rPr lang="en-US" sz="3200" dirty="0"/>
+              <a:t>="false" </a:t>
+            </a:r>
+            <a:r>
+              <a:rPr lang="en-US" sz="3200" dirty="0" err="1"/>
+              <a:t>termName</a:t>
+            </a:r>
+            <a:r>
+              <a:rPr lang="en-US" sz="3200" dirty="0"/>
+              <a:t>="NMR </a:t>
+            </a:r>
+            <a:r>
+              <a:rPr lang="en-US" sz="3200" dirty="0" smtClean="0"/>
+              <a:t>instrument“ </a:t>
+            </a:r>
+            <a:r>
+              <a:rPr lang="en-US" sz="3200" dirty="0" err="1" smtClean="0"/>
+              <a:t>isRepeatable</a:t>
+            </a:r>
+            <a:r>
+              <a:rPr lang="en-US" sz="3200" dirty="0"/>
+              <a:t>="false" </a:t>
+            </a:r>
+            <a:r>
+              <a:rPr lang="en-US" sz="3200" dirty="0" err="1"/>
+              <a:t>allowChildren</a:t>
+            </a:r>
+            <a:r>
+              <a:rPr lang="en-US" sz="3200" dirty="0"/>
+              <a:t>="true" </a:t>
+            </a:r>
+            <a:r>
+              <a:rPr lang="en-US" sz="3200" dirty="0" err="1"/>
+              <a:t>cvIdentifierRef</a:t>
+            </a:r>
+            <a:r>
+              <a:rPr lang="en-US" sz="3200" dirty="0"/>
+              <a:t>="NMR</a:t>
+            </a:r>
+            <a:r>
+              <a:rPr lang="en-US" sz="3200" dirty="0" smtClean="0"/>
+              <a:t>"/&gt;</a:t>
+            </a:r>
+            <a:r>
+              <a:rPr lang="en-US" sz="3200" dirty="0"/>
+              <a:t/>
+            </a:r>
+            <a:br>
+              <a:rPr lang="en-US" sz="3200" dirty="0"/>
+            </a:br>
+            <a:r>
+              <a:rPr lang="en-US" sz="3200" dirty="0"/>
+              <a:t>&lt;</a:t>
+            </a:r>
+            <a:r>
+              <a:rPr lang="en-US" sz="3200" dirty="0" err="1"/>
+              <a:t>CvTerm</a:t>
+            </a:r>
+            <a:r>
+              <a:rPr lang="en-US" sz="3200" dirty="0"/>
+              <a:t> </a:t>
+            </a:r>
+            <a:r>
+              <a:rPr lang="en-US" sz="3200" dirty="0" err="1"/>
+              <a:t>termAccession</a:t>
+            </a:r>
+            <a:r>
+              <a:rPr lang="en-US" sz="3200" dirty="0"/>
+              <a:t>="NMR:1400014" </a:t>
+            </a:r>
+            <a:r>
+              <a:rPr lang="en-US" sz="3200" dirty="0" err="1">
+                <a:solidFill>
+                  <a:srgbClr val="00B050"/>
+                </a:solidFill>
+              </a:rPr>
+              <a:t>useTerm</a:t>
+            </a:r>
+            <a:r>
+              <a:rPr lang="en-US" sz="3200" dirty="0">
+                <a:solidFill>
+                  <a:srgbClr val="00B050"/>
+                </a:solidFill>
+              </a:rPr>
+              <a:t>="false" </a:t>
+            </a:r>
+            <a:r>
+              <a:rPr lang="en-US" sz="3200" dirty="0" err="1">
+                <a:solidFill>
+                  <a:schemeClr val="accent1"/>
+                </a:solidFill>
+              </a:rPr>
+              <a:t>termName</a:t>
+            </a:r>
+            <a:r>
+              <a:rPr lang="en-US" sz="3200" dirty="0">
+                <a:solidFill>
+                  <a:schemeClr val="accent1"/>
+                </a:solidFill>
+              </a:rPr>
+              <a:t>="NMR probe"</a:t>
+            </a:r>
+            <a:br>
+              <a:rPr lang="en-US" sz="3200" dirty="0">
+                <a:solidFill>
+                  <a:schemeClr val="accent1"/>
+                </a:solidFill>
+              </a:rPr>
+            </a:br>
+            <a:r>
+              <a:rPr lang="en-US" sz="3200" dirty="0" err="1"/>
+              <a:t>isRepeatable</a:t>
+            </a:r>
+            <a:r>
+              <a:rPr lang="en-US" sz="3200" dirty="0"/>
+              <a:t>="false" </a:t>
+            </a:r>
+            <a:r>
+              <a:rPr lang="en-US" sz="3200" dirty="0" err="1"/>
+              <a:t>allowChildren</a:t>
+            </a:r>
+            <a:r>
+              <a:rPr lang="en-US" sz="3200" dirty="0"/>
+              <a:t>="true" </a:t>
+            </a:r>
+            <a:r>
+              <a:rPr lang="en-US" sz="3200" dirty="0" err="1"/>
+              <a:t>cvIdentifierRef</a:t>
+            </a:r>
+            <a:r>
+              <a:rPr lang="en-US" sz="3200" dirty="0"/>
+              <a:t>="NMR"/&gt;</a:t>
+            </a:r>
+            <a:br>
+              <a:rPr lang="en-US" sz="3200" dirty="0"/>
+            </a:br>
+            <a:r>
+              <a:rPr lang="en-US" sz="3200" dirty="0"/>
+              <a:t>&lt;/</a:t>
+            </a:r>
+            <a:r>
+              <a:rPr lang="en-US" sz="3200" dirty="0" err="1"/>
+              <a:t>CvMappingRule</a:t>
+            </a:r>
+            <a:r>
+              <a:rPr lang="en-US" sz="3200" dirty="0"/>
+              <a:t>&gt;</a:t>
+            </a:r>
+            <a:endParaRPr lang="en-US" sz="3200" dirty="0"/>
+          </a:p>
+        </p:txBody>
+      </p:sp>
+      <p:pic>
+        <p:nvPicPr>
+          <p:cNvPr id="4" name="Inhaltsplatzhalter 4"/>
+          <p:cNvPicPr>
+            <a:picLocks noChangeAspect="1"/>
+          </p:cNvPicPr>
+          <p:nvPr/>
+        </p:nvPicPr>
+        <p:blipFill>
+          <a:blip r:embed="rId2">
+            <a:extLst>
+              <a:ext uri="{28A0092B-C50C-407E-A947-70E740481C1C}">
+                <a14:useLocalDpi xmlns:a14="http://schemas.microsoft.com/office/drawing/2010/main" val="0"/>
+              </a:ext>
+            </a:extLst>
+          </a:blip>
+          <a:stretch>
+            <a:fillRect/>
+          </a:stretch>
+        </p:blipFill>
+        <p:spPr>
+          <a:xfrm>
+            <a:off x="17269390" y="15293284"/>
+            <a:ext cx="8310076" cy="12883537"/>
+          </a:xfrm>
+          <a:prstGeom prst="rect">
+            <a:avLst/>
+          </a:prstGeom>
+        </p:spPr>
+      </p:pic>
+    </p:spTree>
+    <p:extLst>
+      <p:ext uri="{BB962C8B-B14F-4D97-AF65-F5344CB8AC3E}">
+        <p14:creationId xmlns:p14="http://schemas.microsoft.com/office/powerpoint/2010/main" val="1442834197"/>
+      </p:ext>
+    </p:extLst>
+  </p:cSld>
+  <p:clrMapOvr>
+    <a:masterClrMapping/>
+  </p:clrMapOvr>
 </p:sld>
 </file>
 

</xml_diff>

<commit_message>
major overhaul, also layout wise.
</commit_message>
<xml_diff>
--- a/docs/SchemaDocumentation/nmrML_Poster_Schober.pptx
+++ b/docs/SchemaDocumentation/nmrML_Poster_Schober.pptx
@@ -6,8 +6,7 @@
   </p:sldMasterIdLst>
   <p:sldIdLst>
     <p:sldId id="257" r:id="rId2"/>
-    <p:sldId id="258" r:id="rId3"/>
-    <p:sldId id="259" r:id="rId4"/>
+    <p:sldId id="259" r:id="rId3"/>
   </p:sldIdLst>
   <p:sldSz cx="30275213" cy="42811700"/>
   <p:notesSz cx="6797675" cy="9928225"/>
@@ -392,7 +391,7 @@
             <a:fld id="{220332FB-83C8-E24C-BAB1-A588F05ACF5F}" type="datetimeFigureOut">
               <a:rPr lang="en-US" smtClean="0"/>
               <a:pPr/>
-              <a:t>5/12/2014</a:t>
+              <a:t>5/14/2014</a:t>
             </a:fld>
             <a:endParaRPr lang="en-US"/>
           </a:p>
@@ -564,7 +563,7 @@
             <a:fld id="{220332FB-83C8-E24C-BAB1-A588F05ACF5F}" type="datetimeFigureOut">
               <a:rPr lang="en-US" smtClean="0"/>
               <a:pPr/>
-              <a:t>5/12/2014</a:t>
+              <a:t>5/14/2014</a:t>
             </a:fld>
             <a:endParaRPr lang="en-US"/>
           </a:p>
@@ -746,7 +745,7 @@
             <a:fld id="{220332FB-83C8-E24C-BAB1-A588F05ACF5F}" type="datetimeFigureOut">
               <a:rPr lang="en-US" smtClean="0"/>
               <a:pPr/>
-              <a:t>5/12/2014</a:t>
+              <a:t>5/14/2014</a:t>
             </a:fld>
             <a:endParaRPr lang="en-US"/>
           </a:p>
@@ -918,7 +917,7 @@
             <a:fld id="{220332FB-83C8-E24C-BAB1-A588F05ACF5F}" type="datetimeFigureOut">
               <a:rPr lang="en-US" smtClean="0"/>
               <a:pPr/>
-              <a:t>5/12/2014</a:t>
+              <a:t>5/14/2014</a:t>
             </a:fld>
             <a:endParaRPr lang="en-US"/>
           </a:p>
@@ -1166,7 +1165,7 @@
             <a:fld id="{220332FB-83C8-E24C-BAB1-A588F05ACF5F}" type="datetimeFigureOut">
               <a:rPr lang="en-US" smtClean="0"/>
               <a:pPr/>
-              <a:t>5/12/2014</a:t>
+              <a:t>5/14/2014</a:t>
             </a:fld>
             <a:endParaRPr lang="en-US"/>
           </a:p>
@@ -1456,7 +1455,7 @@
             <a:fld id="{220332FB-83C8-E24C-BAB1-A588F05ACF5F}" type="datetimeFigureOut">
               <a:rPr lang="en-US" smtClean="0"/>
               <a:pPr/>
-              <a:t>5/12/2014</a:t>
+              <a:t>5/14/2014</a:t>
             </a:fld>
             <a:endParaRPr lang="en-US"/>
           </a:p>
@@ -1885,7 +1884,7 @@
             <a:fld id="{220332FB-83C8-E24C-BAB1-A588F05ACF5F}" type="datetimeFigureOut">
               <a:rPr lang="en-US" smtClean="0"/>
               <a:pPr/>
-              <a:t>5/12/2014</a:t>
+              <a:t>5/14/2014</a:t>
             </a:fld>
             <a:endParaRPr lang="en-US"/>
           </a:p>
@@ -2005,7 +2004,7 @@
             <a:fld id="{220332FB-83C8-E24C-BAB1-A588F05ACF5F}" type="datetimeFigureOut">
               <a:rPr lang="en-US" smtClean="0"/>
               <a:pPr/>
-              <a:t>5/12/2014</a:t>
+              <a:t>5/14/2014</a:t>
             </a:fld>
             <a:endParaRPr lang="en-US"/>
           </a:p>
@@ -2102,7 +2101,7 @@
             <a:fld id="{220332FB-83C8-E24C-BAB1-A588F05ACF5F}" type="datetimeFigureOut">
               <a:rPr lang="en-US" smtClean="0"/>
               <a:pPr/>
-              <a:t>5/12/2014</a:t>
+              <a:t>5/14/2014</a:t>
             </a:fld>
             <a:endParaRPr lang="en-US"/>
           </a:p>
@@ -2381,7 +2380,7 @@
             <a:fld id="{220332FB-83C8-E24C-BAB1-A588F05ACF5F}" type="datetimeFigureOut">
               <a:rPr lang="en-US" smtClean="0"/>
               <a:pPr/>
-              <a:t>5/12/2014</a:t>
+              <a:t>5/14/2014</a:t>
             </a:fld>
             <a:endParaRPr lang="en-US"/>
           </a:p>
@@ -2636,7 +2635,7 @@
             <a:fld id="{220332FB-83C8-E24C-BAB1-A588F05ACF5F}" type="datetimeFigureOut">
               <a:rPr lang="en-US" smtClean="0"/>
               <a:pPr/>
-              <a:t>5/12/2014</a:t>
+              <a:t>5/14/2014</a:t>
             </a:fld>
             <a:endParaRPr lang="en-US"/>
           </a:p>
@@ -2851,7 +2850,7 @@
             <a:fld id="{220332FB-83C8-E24C-BAB1-A588F05ACF5F}" type="datetimeFigureOut">
               <a:rPr lang="en-US" smtClean="0"/>
               <a:pPr/>
-              <a:t>5/12/2014</a:t>
+              <a:t>5/14/2014</a:t>
             </a:fld>
             <a:endParaRPr lang="en-US"/>
           </a:p>
@@ -3623,7 +3622,7 @@
               <a:t>The need for an open </a:t>
             </a:r>
             <a:r>
-              <a:rPr lang="en-US" sz="3600" dirty="0" err="1" smtClean="0">
+              <a:rPr lang="en-US" sz="3600" dirty="0" smtClean="0">
                 <a:solidFill>
                   <a:srgbClr val="2F3246"/>
                 </a:solidFill>
@@ -3631,7 +3630,7 @@
                 <a:ea typeface="Verdana" pitchFamily="34" charset="0"/>
                 <a:cs typeface="Verdana" pitchFamily="34" charset="0"/>
               </a:rPr>
-              <a:t>nmr</a:t>
+              <a:t>NMR</a:t>
             </a:r>
             <a:r>
               <a:rPr lang="en-US" sz="3600" dirty="0" smtClean="0">
@@ -3642,7 +3641,18 @@
                 <a:ea typeface="Verdana" pitchFamily="34" charset="0"/>
                 <a:cs typeface="Verdana" pitchFamily="34" charset="0"/>
               </a:rPr>
-              <a:t> standard</a:t>
+              <a:t> </a:t>
+            </a:r>
+            <a:r>
+              <a:rPr lang="en-US" sz="3600" dirty="0" smtClean="0">
+                <a:solidFill>
+                  <a:srgbClr val="2F3246"/>
+                </a:solidFill>
+                <a:latin typeface="Verdana" pitchFamily="34" charset="0"/>
+                <a:ea typeface="Verdana" pitchFamily="34" charset="0"/>
+                <a:cs typeface="Verdana" pitchFamily="34" charset="0"/>
+              </a:rPr>
+              <a:t>standard</a:t>
             </a:r>
             <a:endParaRPr lang="en-US" sz="3600" dirty="0">
               <a:solidFill>
@@ -4276,14 +4286,24 @@
               <a:t>standard is accepted by major open source </a:t>
             </a:r>
             <a:r>
-              <a:rPr lang="en-US" sz="2800" dirty="0" err="1">
+              <a:rPr lang="en-US" sz="2800" dirty="0" smtClean="0">
                 <a:solidFill>
                   <a:srgbClr val="121421"/>
                 </a:solidFill>
                 <a:latin typeface="Verdana"/>
                 <a:cs typeface="Verdana"/>
               </a:rPr>
-              <a:t>nmr</a:t>
+              <a:t>NMR</a:t>
+            </a:r>
+            <a:r>
+              <a:rPr lang="en-US" sz="2800" dirty="0" smtClean="0">
+                <a:solidFill>
+                  <a:srgbClr val="121421"/>
+                </a:solidFill>
+                <a:latin typeface="Verdana"/>
+                <a:cs typeface="Verdana"/>
+              </a:rPr>
+              <a:t> </a:t>
             </a:r>
             <a:r>
               <a:rPr lang="en-US" sz="2800" dirty="0">
@@ -4293,7 +4313,7 @@
                 <a:latin typeface="Verdana"/>
                 <a:cs typeface="Verdana"/>
               </a:rPr>
-              <a:t> data processing tools and will serve </a:t>
+              <a:t>data processing tools and will serve </a:t>
             </a:r>
             <a:r>
               <a:rPr lang="en-US" sz="2800" dirty="0" smtClean="0">
@@ -7841,7 +7861,7 @@
           <a:graphicData uri="http://schemas.openxmlformats.org/presentationml/2006/ole">
             <mc:AlternateContent xmlns:mc="http://schemas.openxmlformats.org/markup-compatibility/2006">
               <mc:Choice xmlns:v="urn:schemas-microsoft-com:vml" Requires="v">
-                <p:oleObj spid="_x0000_s3101" r:id="rId23" imgW="155999880" imgH="75692160" progId="">
+                <p:oleObj spid="_x0000_s3106" r:id="rId23" imgW="155999880" imgH="75692160" progId="">
                   <p:embed/>
                 </p:oleObj>
               </mc:Choice>
@@ -9078,30 +9098,46 @@
           <a:lstStyle/>
           <a:p>
             <a:r>
-              <a:rPr lang="de-DE" sz="4800" dirty="0" smtClean="0"/>
-              <a:t>XSD </a:t>
-            </a:r>
-            <a:r>
               <a:rPr lang="de-DE" sz="4800" dirty="0" err="1" smtClean="0"/>
-              <a:t>based</a:t>
+              <a:t>Rule</a:t>
             </a:r>
             <a:r>
               <a:rPr lang="de-DE" sz="4800" dirty="0" smtClean="0"/>
               <a:t> </a:t>
             </a:r>
             <a:r>
+              <a:rPr lang="de-DE" sz="4800" dirty="0" err="1"/>
+              <a:t>based</a:t>
+            </a:r>
+            <a:r>
+              <a:rPr lang="de-DE" sz="4800" dirty="0"/>
+              <a:t> </a:t>
+            </a:r>
+            <a:r>
+              <a:rPr lang="de-DE" sz="4800" dirty="0" smtClean="0"/>
+              <a:t>CV </a:t>
+            </a:r>
+            <a:r>
+              <a:rPr lang="de-DE" sz="4800" dirty="0" err="1" smtClean="0"/>
+              <a:t>usage</a:t>
+            </a:r>
+            <a:r>
+              <a:rPr lang="de-DE" sz="4800" dirty="0" smtClean="0"/>
+              <a:t> </a:t>
+            </a:r>
+            <a:r>
               <a:rPr lang="de-DE" sz="4800" dirty="0" err="1" smtClean="0"/>
               <a:t>validation</a:t>
             </a:r>
             <a:r>
-              <a:rPr lang="de-DE" sz="4800" dirty="0" smtClean="0"/>
+              <a:rPr lang="de-DE" sz="4800" dirty="0"/>
               <a:t/>
             </a:r>
             <a:br>
-              <a:rPr lang="de-DE" sz="4800" dirty="0" smtClean="0"/>
+              <a:rPr lang="de-DE" sz="4800" dirty="0"/>
             </a:br>
             <a:r>
-              <a:rPr lang="de-DE" sz="4800" dirty="0" err="1" smtClean="0"/>
+              <a:rPr lang="de-DE" sz="4800" dirty="0" err="1"/>
               <a:t>Example</a:t>
             </a:r>
             <a:endParaRPr lang="en-US" sz="4800" dirty="0"/>
@@ -9129,12 +9165,8 @@
               <a:buNone/>
             </a:pPr>
             <a:r>
-              <a:rPr lang="de-DE" sz="3200" dirty="0" err="1" smtClean="0">
-                <a:solidFill>
-                  <a:schemeClr val="accent4"/>
-                </a:solidFill>
-              </a:rPr>
-              <a:t>SourceFile</a:t>
+              <a:rPr lang="de-DE" sz="3200" dirty="0" err="1" smtClean="0"/>
+              <a:t>For</a:t>
             </a:r>
             <a:r>
               <a:rPr lang="de-DE" sz="3200" dirty="0" smtClean="0"/>
@@ -9142,31 +9174,35 @@
             </a:r>
             <a:r>
               <a:rPr lang="de-DE" sz="3200" dirty="0" err="1" smtClean="0"/>
-              <a:t>description</a:t>
+              <a:t>the</a:t>
             </a:r>
             <a:r>
               <a:rPr lang="de-DE" sz="3200" dirty="0" smtClean="0"/>
               <a:t> </a:t>
             </a:r>
             <a:r>
+              <a:rPr lang="de-DE" sz="3200" dirty="0" smtClean="0">
+                <a:solidFill>
+                  <a:schemeClr val="accent4"/>
+                </a:solidFill>
+              </a:rPr>
+              <a:t>Instrument </a:t>
+            </a:r>
+            <a:r>
               <a:rPr lang="de-DE" sz="3200" dirty="0" err="1" smtClean="0">
                 <a:solidFill>
-                  <a:srgbClr val="FF0000"/>
-                </a:solidFill>
-              </a:rPr>
-              <a:t>requires</a:t>
+                  <a:schemeClr val="accent4"/>
+                </a:solidFill>
+              </a:rPr>
+              <a:t>configuration</a:t>
             </a:r>
             <a:r>
               <a:rPr lang="de-DE" sz="3200" dirty="0" smtClean="0"/>
-              <a:t> a </a:t>
-            </a:r>
-            <a:r>
-              <a:rPr lang="de-DE" sz="3200" dirty="0" err="1" smtClean="0">
-                <a:solidFill>
-                  <a:schemeClr val="accent1"/>
-                </a:solidFill>
-              </a:rPr>
-              <a:t>name</a:t>
+              <a:t>, </a:t>
+            </a:r>
+            <a:r>
+              <a:rPr lang="de-DE" sz="3200" dirty="0" err="1" smtClean="0"/>
+              <a:t>the</a:t>
             </a:r>
             <a:r>
               <a:rPr lang="de-DE" sz="3200" dirty="0" smtClean="0"/>
@@ -9174,7 +9210,7 @@
             </a:r>
             <a:r>
               <a:rPr lang="de-DE" sz="3200" dirty="0" err="1" smtClean="0"/>
-              <a:t>to</a:t>
+              <a:t>mapping</a:t>
             </a:r>
             <a:r>
               <a:rPr lang="de-DE" sz="3200" dirty="0" smtClean="0"/>
@@ -9182,7 +9218,7 @@
             </a:r>
             <a:r>
               <a:rPr lang="de-DE" sz="3200" dirty="0" err="1" smtClean="0"/>
-              <a:t>be</a:t>
+              <a:t>rule</a:t>
             </a:r>
             <a:r>
               <a:rPr lang="de-DE" sz="3200" dirty="0" smtClean="0"/>
@@ -9190,7 +9226,67 @@
             </a:r>
             <a:r>
               <a:rPr lang="de-DE" sz="3200" dirty="0" err="1" smtClean="0"/>
-              <a:t>specified</a:t>
+              <a:t>file</a:t>
+            </a:r>
+            <a:r>
+              <a:rPr lang="de-DE" sz="3200" dirty="0"/>
+              <a:t> </a:t>
+            </a:r>
+            <a:r>
+              <a:rPr lang="de-DE" sz="3200" dirty="0" err="1" smtClean="0"/>
+              <a:t>enforces</a:t>
+            </a:r>
+            <a:r>
+              <a:rPr lang="de-DE" sz="3200" dirty="0" smtClean="0"/>
+              <a:t> (</a:t>
+            </a:r>
+            <a:r>
+              <a:rPr lang="de-DE" sz="3200" dirty="0" smtClean="0">
+                <a:solidFill>
+                  <a:srgbClr val="FF0000"/>
+                </a:solidFill>
+              </a:rPr>
+              <a:t>must</a:t>
+            </a:r>
+            <a:r>
+              <a:rPr lang="de-DE" sz="3200" dirty="0" smtClean="0"/>
+              <a:t>) a </a:t>
+            </a:r>
+            <a:r>
+              <a:rPr lang="de-DE" sz="3200" dirty="0" smtClean="0">
+                <a:solidFill>
+                  <a:schemeClr val="accent1"/>
+                </a:solidFill>
+              </a:rPr>
+              <a:t>NMR probe </a:t>
+            </a:r>
+            <a:r>
+              <a:rPr lang="de-DE" sz="3200" dirty="0" err="1" smtClean="0">
+                <a:solidFill>
+                  <a:srgbClr val="00B050"/>
+                </a:solidFill>
+              </a:rPr>
+              <a:t>subclass</a:t>
+            </a:r>
+            <a:r>
+              <a:rPr lang="de-DE" sz="3200" dirty="0" smtClean="0">
+                <a:solidFill>
+                  <a:schemeClr val="accent1"/>
+                </a:solidFill>
+              </a:rPr>
+              <a:t> </a:t>
+            </a:r>
+            <a:r>
+              <a:rPr lang="de-DE" sz="3200" dirty="0" err="1" smtClean="0"/>
+              <a:t>specification</a:t>
+            </a:r>
+            <a:r>
+              <a:rPr lang="de-DE" sz="3200" dirty="0" smtClean="0"/>
+              <a:t> via an NMR CV </a:t>
+            </a:r>
+            <a:r>
+              <a:rPr lang="de-DE" sz="3200" dirty="0" err="1" smtClean="0"/>
+              <a:t>term</a:t>
             </a:r>
             <a:r>
               <a:rPr lang="de-DE" sz="3200" dirty="0" smtClean="0"/>
@@ -9209,203 +9305,218 @@
             </a:pPr>
             <a:r>
               <a:rPr lang="en-US" sz="3200" dirty="0" smtClean="0"/>
-              <a:t> </a:t>
+              <a:t>&lt;</a:t>
+            </a:r>
+            <a:r>
+              <a:rPr lang="en-US" sz="3200" dirty="0" err="1"/>
+              <a:t>CvMappingRule</a:t>
             </a:r>
             <a:r>
               <a:rPr lang="en-US" sz="3200" dirty="0"/>
-              <a:t>&lt;</a:t>
+              <a:t> id="</a:t>
             </a:r>
             <a:r>
               <a:rPr lang="en-US" sz="3200" dirty="0" err="1"/>
-              <a:t>xs:complexType</a:t>
+              <a:t>instrumentConfiguration_must</a:t>
             </a:r>
             <a:r>
               <a:rPr lang="en-US" sz="3200" dirty="0"/>
-              <a:t> name="</a:t>
-            </a:r>
-            <a:r>
-              <a:rPr lang="en-US" sz="3200" dirty="0" err="1">
-                <a:solidFill>
-                  <a:schemeClr val="accent4"/>
-                </a:solidFill>
-              </a:rPr>
-              <a:t>SourceFileType</a:t>
-            </a:r>
-            <a:r>
-              <a:rPr lang="en-US" sz="3200" dirty="0"/>
-              <a:t>"&gt;</a:t>
+              <a:t>"</a:t>
             </a:r>
             <a:br>
               <a:rPr lang="en-US" sz="3200" dirty="0"/>
             </a:br>
             <a:r>
+              <a:rPr lang="en-US" sz="3200" dirty="0" err="1"/>
+              <a:t>cvElementPath</a:t>
+            </a:r>
+            <a:r>
               <a:rPr lang="en-US" sz="3200" dirty="0"/>
-              <a:t>    &lt;</a:t>
+              <a:t>="/</a:t>
             </a:r>
             <a:r>
               <a:rPr lang="en-US" sz="3200" dirty="0" err="1"/>
-              <a:t>xs:annotation</a:t>
-            </a:r>
-            <a:r>
-              <a:rPr lang="en-US" sz="3200" dirty="0" smtClean="0"/>
-              <a:t>&gt; &lt;</a:t>
-            </a:r>
-            <a:r>
-              <a:rPr lang="en-US" sz="3200" dirty="0" err="1" smtClean="0"/>
-              <a:t>xs:documentation</a:t>
-            </a:r>
-            <a:r>
-              <a:rPr lang="en-US" sz="3200" dirty="0" smtClean="0"/>
-              <a:t>&gt;It could </a:t>
+              <a:t>nmrML</a:t>
             </a:r>
             <a:r>
               <a:rPr lang="en-US" sz="3200" dirty="0"/>
-              <a:t>point to an FID file, a </a:t>
-            </a:r>
-            <a:r>
-              <a:rPr lang="en-US" sz="3200" dirty="0" err="1" smtClean="0"/>
-              <a:t>procpar</a:t>
-            </a:r>
-            <a:r>
-              <a:rPr lang="en-US" sz="3200" dirty="0" smtClean="0"/>
-              <a:t> file.&lt;/</a:t>
+              <a:t>/</a:t>
             </a:r>
             <a:r>
               <a:rPr lang="en-US" sz="3200" dirty="0" err="1"/>
-              <a:t>xs:documentation</a:t>
-            </a:r>
-            <a:r>
-              <a:rPr lang="en-US" sz="3200" dirty="0" smtClean="0"/>
-              <a:t>&gt;  </a:t>
+              <a:t>instrumentConfigurationList</a:t>
             </a:r>
             <a:r>
               <a:rPr lang="en-US" sz="3200" dirty="0"/>
-              <a:t>&lt;/</a:t>
-            </a:r>
-            <a:r>
-              <a:rPr lang="en-US" sz="3200" dirty="0" err="1"/>
-              <a:t>xs:annotation</a:t>
-            </a:r>
-            <a:r>
-              <a:rPr lang="en-US" sz="3200" dirty="0" smtClean="0"/>
-              <a:t>&gt; […]</a:t>
+              <a:t>/</a:t>
+            </a:r>
+            <a:r>
+              <a:rPr lang="en-US" sz="3200" dirty="0" err="1">
+                <a:solidFill>
+                  <a:schemeClr val="accent4"/>
+                </a:solidFill>
+              </a:rPr>
+              <a:t>instrumentConfiguration</a:t>
+            </a:r>
+            <a:r>
+              <a:rPr lang="en-US" sz="3200" dirty="0">
+                <a:solidFill>
+                  <a:schemeClr val="accent4"/>
+                </a:solidFill>
+              </a:rPr>
+              <a:t>/</a:t>
+            </a:r>
+            <a:r>
+              <a:rPr lang="en-US" sz="3200" dirty="0" err="1">
+                <a:solidFill>
+                  <a:schemeClr val="accent4"/>
+                </a:solidFill>
+              </a:rPr>
+              <a:t>cvParam</a:t>
             </a:r>
             <a:r>
               <a:rPr lang="en-US" sz="3200" dirty="0"/>
-              <a:t/>
+              <a:t>/@accession"</a:t>
             </a:r>
             <a:br>
               <a:rPr lang="en-US" sz="3200" dirty="0"/>
             </a:br>
             <a:r>
-              <a:rPr lang="en-US" sz="3200" dirty="0" smtClean="0"/>
-              <a:t>        </a:t>
+              <a:rPr lang="en-US" sz="3200" dirty="0" err="1">
+                <a:solidFill>
+                  <a:srgbClr val="FF0000"/>
+                </a:solidFill>
+              </a:rPr>
+              <a:t>requirementLevel</a:t>
+            </a:r>
+            <a:r>
+              <a:rPr lang="en-US" sz="3200" dirty="0">
+                <a:solidFill>
+                  <a:srgbClr val="FF0000"/>
+                </a:solidFill>
+              </a:rPr>
+              <a:t>="MUST"</a:t>
+            </a:r>
+            <a:br>
+              <a:rPr lang="en-US" sz="3200" dirty="0">
+                <a:solidFill>
+                  <a:srgbClr val="FF0000"/>
+                </a:solidFill>
+              </a:rPr>
+            </a:br>
+            <a:r>
+              <a:rPr lang="en-US" sz="3200" dirty="0" err="1"/>
+              <a:t>scopePath</a:t>
             </a:r>
             <a:r>
               <a:rPr lang="en-US" sz="3200" dirty="0"/>
-              <a:t>&lt;</a:t>
+              <a:t>="/</a:t>
             </a:r>
             <a:r>
               <a:rPr lang="en-US" sz="3200" dirty="0" err="1"/>
-              <a:t>xs:attribute</a:t>
+              <a:t>nmrML</a:t>
             </a:r>
             <a:r>
               <a:rPr lang="en-US" sz="3200" dirty="0"/>
-              <a:t> name="</a:t>
-            </a:r>
-            <a:r>
-              <a:rPr lang="en-US" sz="3200" dirty="0">
-                <a:solidFill>
-                  <a:schemeClr val="accent1"/>
-                </a:solidFill>
-              </a:rPr>
-              <a:t>name</a:t>
+              <a:t>/</a:t>
+            </a:r>
+            <a:r>
+              <a:rPr lang="en-US" sz="3200" dirty="0" err="1"/>
+              <a:t>instrumentConfigurationList</a:t>
             </a:r>
             <a:r>
               <a:rPr lang="en-US" sz="3200" dirty="0"/>
-              <a:t>" type="</a:t>
+              <a:t>/</a:t>
             </a:r>
             <a:r>
               <a:rPr lang="en-US" sz="3200" dirty="0" err="1"/>
-              <a:t>xs:string</a:t>
+              <a:t>instrumentConfiguration</a:t>
             </a:r>
             <a:r>
               <a:rPr lang="en-US" sz="3200" dirty="0"/>
-              <a:t>" </a:t>
-            </a:r>
-            <a:r>
-              <a:rPr lang="en-US" sz="3200" dirty="0">
-                <a:solidFill>
-                  <a:srgbClr val="FF0000"/>
-                </a:solidFill>
-              </a:rPr>
-              <a:t>use="required"</a:t>
-            </a:r>
-            <a:r>
-              <a:rPr lang="en-US" sz="3200" dirty="0"/>
-              <a:t>&gt;</a:t>
+              <a:t>/"</a:t>
             </a:r>
             <a:br>
               <a:rPr lang="en-US" sz="3200" dirty="0"/>
             </a:br>
             <a:r>
+              <a:rPr lang="en-US" sz="3200" dirty="0" err="1"/>
+              <a:t>cvTermsCombinationLogic</a:t>
+            </a:r>
+            <a:r>
               <a:rPr lang="en-US" sz="3200" dirty="0"/>
-              <a:t>          &lt;</a:t>
-            </a:r>
-            <a:r>
-              <a:rPr lang="en-US" sz="3200" dirty="0" err="1"/>
-              <a:t>xs:annotation</a:t>
-            </a:r>
-            <a:r>
-              <a:rPr lang="en-US" sz="3200" dirty="0" smtClean="0"/>
-              <a:t>&gt; &lt;</a:t>
-            </a:r>
-            <a:r>
-              <a:rPr lang="en-US" sz="3200" dirty="0" err="1"/>
-              <a:t>xs:documentation</a:t>
-            </a:r>
-            <a:r>
-              <a:rPr lang="en-US" sz="3200" dirty="0"/>
-              <a:t>&gt;Name of the source file, without reference to location (either URI </a:t>
-            </a:r>
-            <a:r>
-              <a:rPr lang="en-US" sz="3200" dirty="0" smtClean="0"/>
-              <a:t>or </a:t>
-            </a:r>
-            <a:r>
-              <a:rPr lang="en-US" sz="3200" dirty="0"/>
-              <a:t>local path).&lt;/</a:t>
-            </a:r>
-            <a:r>
-              <a:rPr lang="en-US" sz="3200" dirty="0" err="1"/>
-              <a:t>xs:documentation</a:t>
-            </a:r>
-            <a:r>
-              <a:rPr lang="en-US" sz="3200" dirty="0" smtClean="0"/>
-              <a:t>&gt; &lt;/</a:t>
-            </a:r>
-            <a:r>
-              <a:rPr lang="en-US" sz="3200" dirty="0" err="1"/>
-              <a:t>xs:annotation</a:t>
-            </a:r>
-            <a:r>
-              <a:rPr lang="en-US" sz="3200" dirty="0"/>
-              <a:t>&gt;</a:t>
+              <a:t>="AND"&gt;</a:t>
             </a:r>
             <a:br>
               <a:rPr lang="en-US" sz="3200" dirty="0"/>
             </a:br>
             <a:r>
               <a:rPr lang="en-US" sz="3200" dirty="0"/>
-              <a:t>        &lt;/</a:t>
+              <a:t>&lt;</a:t>
             </a:r>
             <a:r>
               <a:rPr lang="en-US" sz="3200" dirty="0" err="1"/>
-              <a:t>xs:attribute</a:t>
+              <a:t>CvTerm</a:t>
+            </a:r>
+            <a:r>
+              <a:rPr lang="en-US" sz="3200" dirty="0"/>
+              <a:t> </a:t>
+            </a:r>
+            <a:r>
+              <a:rPr lang="en-US" sz="3200" dirty="0" err="1"/>
+              <a:t>termAccession</a:t>
+            </a:r>
+            <a:r>
+              <a:rPr lang="en-US" sz="3200" dirty="0"/>
+              <a:t>="NMR:1400059" </a:t>
+            </a:r>
+            <a:r>
+              <a:rPr lang="en-US" sz="3200" dirty="0" err="1" smtClean="0"/>
+              <a:t>useTerm</a:t>
+            </a:r>
+            <a:r>
+              <a:rPr lang="en-US" sz="3200" dirty="0"/>
+              <a:t>="false" </a:t>
+            </a:r>
+            <a:r>
+              <a:rPr lang="en-US" sz="3200" dirty="0" err="1"/>
+              <a:t>termName</a:t>
+            </a:r>
+            <a:r>
+              <a:rPr lang="en-US" sz="3200" dirty="0"/>
+              <a:t>="NMR </a:t>
             </a:r>
             <a:r>
               <a:rPr lang="en-US" sz="3200" dirty="0" smtClean="0"/>
-              <a:t>&gt; […]</a:t>
+              <a:t>instrument“ </a:t>
+            </a:r>
+            <a:r>
+              <a:rPr lang="en-US" sz="3200" dirty="0" err="1" smtClean="0"/>
+              <a:t>isRepeatable</a:t>
+            </a:r>
+            <a:r>
+              <a:rPr lang="en-US" sz="3200" dirty="0"/>
+              <a:t>="false" </a:t>
+            </a:r>
+            <a:r>
+              <a:rPr lang="en-US" sz="3200" dirty="0" err="1"/>
+              <a:t>allowChildren</a:t>
+            </a:r>
+            <a:r>
+              <a:rPr lang="en-US" sz="3200" dirty="0"/>
+              <a:t>="true" </a:t>
+            </a:r>
+            <a:r>
+              <a:rPr lang="en-US" sz="3200" dirty="0" err="1"/>
+              <a:t>cvIdentifierRef</a:t>
+            </a:r>
+            <a:r>
+              <a:rPr lang="en-US" sz="3200" dirty="0"/>
+              <a:t>="NMR</a:t>
+            </a:r>
+            <a:r>
+              <a:rPr lang="en-US" sz="3200" dirty="0" smtClean="0"/>
+              <a:t>"/&gt;</a:t>
             </a:r>
             <a:r>
               <a:rPr lang="en-US" sz="3200" dirty="0"/>
@@ -9416,582 +9527,91 @@
             </a:br>
             <a:r>
               <a:rPr lang="en-US" sz="3200" dirty="0"/>
-              <a:t>  &lt;/</a:t>
+              <a:t>&lt;</a:t>
             </a:r>
             <a:r>
               <a:rPr lang="en-US" sz="3200" dirty="0" err="1"/>
-              <a:t>xs:complexType</a:t>
+              <a:t>CvTerm</a:t>
             </a:r>
             <a:r>
               <a:rPr lang="en-US" sz="3200" dirty="0"/>
-              <a:t>&gt;</a:t>
-            </a:r>
-            <a:endParaRPr lang="en-US" sz="3200" dirty="0"/>
-          </a:p>
-        </p:txBody>
-      </p:sp>
-    </p:spTree>
-    <p:extLst>
-      <p:ext uri="{BB962C8B-B14F-4D97-AF65-F5344CB8AC3E}">
-        <p14:creationId xmlns:p14="http://schemas.microsoft.com/office/powerpoint/2010/main" val="607307610"/>
-      </p:ext>
-    </p:extLst>
-  </p:cSld>
-  <p:clrMapOvr>
-    <a:masterClrMapping/>
-  </p:clrMapOvr>
-</p:sld>
-</file>
-
-<file path=ppt/slides/slide3.xml><?xml version="1.0" encoding="utf-8"?>
-<p:sld xmlns:a="http://schemas.openxmlformats.org/drawingml/2006/main" xmlns:r="http://schemas.openxmlformats.org/officeDocument/2006/relationships" xmlns:p="http://schemas.openxmlformats.org/presentationml/2006/main">
-  <p:cSld>
-    <p:spTree>
-      <p:nvGrpSpPr>
-        <p:cNvPr id="1" name=""/>
-        <p:cNvGrpSpPr/>
-        <p:nvPr/>
-      </p:nvGrpSpPr>
-      <p:grpSpPr>
-        <a:xfrm>
-          <a:off x="0" y="0"/>
-          <a:ext cx="0" cy="0"/>
-          <a:chOff x="0" y="0"/>
-          <a:chExt cx="0" cy="0"/>
-        </a:xfrm>
-      </p:grpSpPr>
-      <p:sp>
-        <p:nvSpPr>
-          <p:cNvPr id="2" name="Titel 1"/>
-          <p:cNvSpPr>
-            <a:spLocks noGrp="1"/>
-          </p:cNvSpPr>
-          <p:nvPr>
-            <p:ph type="title"/>
-          </p:nvPr>
-        </p:nvSpPr>
-        <p:spPr/>
-        <p:txBody>
-          <a:bodyPr>
-            <a:normAutofit/>
-          </a:bodyPr>
-          <a:lstStyle/>
-          <a:p>
-            <a:r>
-              <a:rPr lang="de-DE" sz="4800" dirty="0" err="1" smtClean="0"/>
-              <a:t>Rule</a:t>
-            </a:r>
-            <a:r>
-              <a:rPr lang="de-DE" sz="4800" dirty="0" smtClean="0"/>
               <a:t> </a:t>
             </a:r>
             <a:r>
-              <a:rPr lang="de-DE" sz="4800" dirty="0" err="1"/>
-              <a:t>based</a:t>
-            </a:r>
-            <a:r>
-              <a:rPr lang="de-DE" sz="4800" dirty="0"/>
-              <a:t> </a:t>
-            </a:r>
-            <a:r>
-              <a:rPr lang="de-DE" sz="4800" dirty="0" smtClean="0"/>
-              <a:t>CV </a:t>
-            </a:r>
-            <a:r>
-              <a:rPr lang="de-DE" sz="4800" dirty="0" err="1" smtClean="0"/>
-              <a:t>usage</a:t>
-            </a:r>
-            <a:r>
-              <a:rPr lang="de-DE" sz="4800" dirty="0" smtClean="0"/>
-              <a:t> </a:t>
-            </a:r>
-            <a:r>
-              <a:rPr lang="de-DE" sz="4800" dirty="0" err="1" smtClean="0"/>
-              <a:t>validation</a:t>
-            </a:r>
-            <a:r>
-              <a:rPr lang="de-DE" sz="4800" dirty="0"/>
-              <a:t/>
+              <a:rPr lang="en-US" sz="3200" dirty="0" err="1"/>
+              <a:t>termAccession</a:t>
+            </a:r>
+            <a:r>
+              <a:rPr lang="en-US" sz="3200" dirty="0"/>
+              <a:t>="NMR:1400014" </a:t>
+            </a:r>
+            <a:r>
+              <a:rPr lang="en-US" sz="3200" dirty="0" err="1">
+                <a:solidFill>
+                  <a:srgbClr val="00B050"/>
+                </a:solidFill>
+              </a:rPr>
+              <a:t>useTerm</a:t>
+            </a:r>
+            <a:r>
+              <a:rPr lang="en-US" sz="3200" dirty="0">
+                <a:solidFill>
+                  <a:srgbClr val="00B050"/>
+                </a:solidFill>
+              </a:rPr>
+              <a:t>="false" </a:t>
+            </a:r>
+            <a:r>
+              <a:rPr lang="en-US" sz="3200" dirty="0" err="1">
+                <a:solidFill>
+                  <a:schemeClr val="accent1"/>
+                </a:solidFill>
+              </a:rPr>
+              <a:t>termName</a:t>
+            </a:r>
+            <a:r>
+              <a:rPr lang="en-US" sz="3200" dirty="0">
+                <a:solidFill>
+                  <a:schemeClr val="accent1"/>
+                </a:solidFill>
+              </a:rPr>
+              <a:t>="NMR probe"</a:t>
             </a:r>
             <a:br>
-              <a:rPr lang="de-DE" sz="4800" dirty="0"/>
+              <a:rPr lang="en-US" sz="3200" dirty="0">
+                <a:solidFill>
+                  <a:schemeClr val="accent1"/>
+                </a:solidFill>
+              </a:rPr>
             </a:br>
             <a:r>
-              <a:rPr lang="de-DE" sz="4800" dirty="0" err="1"/>
-              <a:t>Example</a:t>
-            </a:r>
-            <a:endParaRPr lang="en-US" sz="4800" dirty="0"/>
-          </a:p>
-        </p:txBody>
-      </p:sp>
-      <p:sp>
-        <p:nvSpPr>
-          <p:cNvPr id="3" name="Inhaltsplatzhalter 2"/>
-          <p:cNvSpPr>
-            <a:spLocks noGrp="1"/>
-          </p:cNvSpPr>
-          <p:nvPr>
-            <p:ph idx="1"/>
-          </p:nvPr>
-        </p:nvSpPr>
-        <p:spPr/>
-        <p:txBody>
-          <a:bodyPr>
-            <a:normAutofit/>
-          </a:bodyPr>
-          <a:lstStyle/>
-          <a:p>
-            <a:pPr marL="0" indent="0">
-              <a:buNone/>
-            </a:pPr>
-            <a:r>
-              <a:rPr lang="de-DE" sz="3200" dirty="0" err="1" smtClean="0"/>
-              <a:t>For</a:t>
-            </a:r>
-            <a:r>
-              <a:rPr lang="de-DE" sz="3200" dirty="0" smtClean="0"/>
-              <a:t> </a:t>
-            </a:r>
-            <a:r>
-              <a:rPr lang="de-DE" sz="3200" dirty="0" err="1" smtClean="0"/>
-              <a:t>the</a:t>
-            </a:r>
-            <a:r>
-              <a:rPr lang="de-DE" sz="3200" dirty="0" smtClean="0"/>
-              <a:t> </a:t>
-            </a:r>
-            <a:r>
-              <a:rPr lang="de-DE" sz="3200" dirty="0" smtClean="0">
-                <a:solidFill>
-                  <a:schemeClr val="accent4"/>
-                </a:solidFill>
-              </a:rPr>
-              <a:t>Instrument </a:t>
-            </a:r>
-            <a:r>
-              <a:rPr lang="de-DE" sz="3200" dirty="0" err="1" smtClean="0">
-                <a:solidFill>
-                  <a:schemeClr val="accent4"/>
-                </a:solidFill>
-              </a:rPr>
-              <a:t>configuration</a:t>
-            </a:r>
-            <a:r>
-              <a:rPr lang="de-DE" sz="3200" dirty="0" smtClean="0"/>
-              <a:t>, </a:t>
-            </a:r>
-            <a:r>
-              <a:rPr lang="de-DE" sz="3200" dirty="0" err="1" smtClean="0"/>
-              <a:t>the</a:t>
-            </a:r>
-            <a:r>
-              <a:rPr lang="de-DE" sz="3200" dirty="0" smtClean="0"/>
-              <a:t> </a:t>
-            </a:r>
-            <a:r>
-              <a:rPr lang="de-DE" sz="3200" dirty="0" err="1" smtClean="0"/>
-              <a:t>mapping</a:t>
-            </a:r>
-            <a:r>
-              <a:rPr lang="de-DE" sz="3200" dirty="0" smtClean="0"/>
-              <a:t> </a:t>
-            </a:r>
-            <a:r>
-              <a:rPr lang="de-DE" sz="3200" dirty="0" err="1" smtClean="0"/>
-              <a:t>rule</a:t>
-            </a:r>
-            <a:r>
-              <a:rPr lang="de-DE" sz="3200" dirty="0" smtClean="0"/>
-              <a:t> </a:t>
-            </a:r>
-            <a:r>
-              <a:rPr lang="de-DE" sz="3200" dirty="0" err="1" smtClean="0"/>
-              <a:t>file</a:t>
-            </a:r>
-            <a:r>
-              <a:rPr lang="de-DE" sz="3200" dirty="0"/>
-              <a:t> </a:t>
-            </a:r>
-            <a:r>
-              <a:rPr lang="de-DE" sz="3200" dirty="0" err="1" smtClean="0"/>
-              <a:t>enforces</a:t>
-            </a:r>
-            <a:r>
-              <a:rPr lang="de-DE" sz="3200" dirty="0" smtClean="0"/>
-              <a:t> (</a:t>
-            </a:r>
-            <a:r>
-              <a:rPr lang="de-DE" sz="3200" dirty="0" smtClean="0">
-                <a:solidFill>
-                  <a:srgbClr val="FF0000"/>
-                </a:solidFill>
-              </a:rPr>
-              <a:t>must</a:t>
-            </a:r>
-            <a:r>
-              <a:rPr lang="de-DE" sz="3200" dirty="0" smtClean="0"/>
-              <a:t>) a </a:t>
-            </a:r>
-            <a:r>
-              <a:rPr lang="de-DE" sz="3200" dirty="0" smtClean="0">
-                <a:solidFill>
-                  <a:schemeClr val="accent1"/>
-                </a:solidFill>
-              </a:rPr>
-              <a:t>NMR probe </a:t>
-            </a:r>
-            <a:r>
-              <a:rPr lang="de-DE" sz="3200" dirty="0" err="1" smtClean="0">
-                <a:solidFill>
-                  <a:srgbClr val="00B050"/>
-                </a:solidFill>
-              </a:rPr>
-              <a:t>subclass</a:t>
-            </a:r>
-            <a:r>
-              <a:rPr lang="de-DE" sz="3200" dirty="0" smtClean="0">
-                <a:solidFill>
-                  <a:schemeClr val="accent1"/>
-                </a:solidFill>
-              </a:rPr>
-              <a:t> </a:t>
-            </a:r>
-            <a:r>
-              <a:rPr lang="de-DE" sz="3200" dirty="0" err="1" smtClean="0"/>
-              <a:t>specification</a:t>
-            </a:r>
-            <a:r>
-              <a:rPr lang="de-DE" sz="3200" dirty="0" smtClean="0"/>
-              <a:t> via an NMR CV </a:t>
-            </a:r>
-            <a:r>
-              <a:rPr lang="de-DE" sz="3200" dirty="0" err="1" smtClean="0"/>
-              <a:t>term</a:t>
-            </a:r>
-            <a:r>
-              <a:rPr lang="de-DE" sz="3200" dirty="0" smtClean="0"/>
-              <a:t>:</a:t>
-            </a:r>
-          </a:p>
-          <a:p>
-            <a:pPr marL="0" indent="0">
-              <a:buNone/>
-            </a:pPr>
-            <a:endParaRPr lang="en-US" sz="3200" dirty="0" smtClean="0"/>
-          </a:p>
-          <a:p>
-            <a:pPr marL="0" indent="0">
-              <a:buNone/>
-            </a:pPr>
-            <a:r>
-              <a:rPr lang="en-US" sz="3200" dirty="0" smtClean="0"/>
-              <a:t>&lt;</a:t>
-            </a:r>
-            <a:r>
               <a:rPr lang="en-US" sz="3200" dirty="0" err="1"/>
-              <a:t>CvMappingRule</a:t>
+              <a:t>isRepeatable</a:t>
             </a:r>
             <a:r>
               <a:rPr lang="en-US" sz="3200" dirty="0"/>
-              <a:t> id="</a:t>
+              <a:t>="false" </a:t>
             </a:r>
             <a:r>
               <a:rPr lang="en-US" sz="3200" dirty="0" err="1"/>
-              <a:t>instrumentConfiguration_must</a:t>
+              <a:t>allowChildren</a:t>
             </a:r>
             <a:r>
               <a:rPr lang="en-US" sz="3200" dirty="0"/>
-              <a:t>"</a:t>
+              <a:t>="true" </a:t>
+            </a:r>
+            <a:r>
+              <a:rPr lang="en-US" sz="3200" dirty="0" err="1"/>
+              <a:t>cvIdentifierRef</a:t>
+            </a:r>
+            <a:r>
+              <a:rPr lang="en-US" sz="3200" dirty="0"/>
+              <a:t>="NMR"/&gt;</a:t>
             </a:r>
             <a:br>
               <a:rPr lang="en-US" sz="3200" dirty="0"/>
             </a:br>
             <a:r>
-              <a:rPr lang="en-US" sz="3200" dirty="0" err="1"/>
-              <a:t>cvElementPath</a:t>
-            </a:r>
-            <a:r>
-              <a:rPr lang="en-US" sz="3200" dirty="0"/>
-              <a:t>="/</a:t>
-            </a:r>
-            <a:r>
-              <a:rPr lang="en-US" sz="3200" dirty="0" err="1"/>
-              <a:t>nmrML</a:t>
-            </a:r>
-            <a:r>
-              <a:rPr lang="en-US" sz="3200" dirty="0"/>
-              <a:t>/</a:t>
-            </a:r>
-            <a:r>
-              <a:rPr lang="en-US" sz="3200" dirty="0" err="1"/>
-              <a:t>instrumentConfigurationList</a:t>
-            </a:r>
-            <a:r>
-              <a:rPr lang="en-US" sz="3200" dirty="0"/>
-              <a:t>/</a:t>
-            </a:r>
-            <a:r>
-              <a:rPr lang="en-US" sz="3200" dirty="0" err="1">
-                <a:solidFill>
-                  <a:schemeClr val="accent4"/>
-                </a:solidFill>
-              </a:rPr>
-              <a:t>instrumentConfiguration</a:t>
-            </a:r>
-            <a:r>
-              <a:rPr lang="en-US" sz="3200" dirty="0">
-                <a:solidFill>
-                  <a:schemeClr val="accent4"/>
-                </a:solidFill>
-              </a:rPr>
-              <a:t>/</a:t>
-            </a:r>
-            <a:r>
-              <a:rPr lang="en-US" sz="3200" dirty="0" err="1">
-                <a:solidFill>
-                  <a:schemeClr val="accent4"/>
-                </a:solidFill>
-              </a:rPr>
-              <a:t>cvParam</a:t>
-            </a:r>
-            <a:r>
-              <a:rPr lang="en-US" sz="3200" dirty="0"/>
-              <a:t>/@accession"</a:t>
-            </a:r>
-            <a:br>
-              <a:rPr lang="en-US" sz="3200" dirty="0"/>
-            </a:br>
-            <a:r>
-              <a:rPr lang="en-US" sz="3200" dirty="0" err="1">
-                <a:solidFill>
-                  <a:srgbClr val="FF0000"/>
-                </a:solidFill>
-              </a:rPr>
-              <a:t>requirementLevel</a:t>
-            </a:r>
-            <a:r>
-              <a:rPr lang="en-US" sz="3200" dirty="0">
-                <a:solidFill>
-                  <a:srgbClr val="FF0000"/>
-                </a:solidFill>
-              </a:rPr>
-              <a:t>="MUST"</a:t>
-            </a:r>
-            <a:br>
-              <a:rPr lang="en-US" sz="3200" dirty="0">
-                <a:solidFill>
-                  <a:srgbClr val="FF0000"/>
-                </a:solidFill>
-              </a:rPr>
-            </a:br>
-            <a:r>
-              <a:rPr lang="en-US" sz="3200" dirty="0" err="1"/>
-              <a:t>scopePath</a:t>
-            </a:r>
-            <a:r>
-              <a:rPr lang="en-US" sz="3200" dirty="0"/>
-              <a:t>="/</a:t>
-            </a:r>
-            <a:r>
-              <a:rPr lang="en-US" sz="3200" dirty="0" err="1"/>
-              <a:t>nmrML</a:t>
-            </a:r>
-            <a:r>
-              <a:rPr lang="en-US" sz="3200" dirty="0"/>
-              <a:t>/</a:t>
-            </a:r>
-            <a:r>
-              <a:rPr lang="en-US" sz="3200" dirty="0" err="1"/>
-              <a:t>instrumentConfigurationList</a:t>
-            </a:r>
-            <a:r>
-              <a:rPr lang="en-US" sz="3200" dirty="0"/>
-              <a:t>/</a:t>
-            </a:r>
-            <a:r>
-              <a:rPr lang="en-US" sz="3200" dirty="0" err="1"/>
-              <a:t>instrumentConfiguration</a:t>
-            </a:r>
-            <a:r>
-              <a:rPr lang="en-US" sz="3200" dirty="0"/>
-              <a:t>/"</a:t>
-            </a:r>
-            <a:br>
-              <a:rPr lang="en-US" sz="3200" dirty="0"/>
-            </a:br>
-            <a:r>
-              <a:rPr lang="en-US" sz="3200" dirty="0" err="1"/>
-              <a:t>cvTermsCombinationLogic</a:t>
-            </a:r>
-            <a:r>
-              <a:rPr lang="en-US" sz="3200" dirty="0"/>
-              <a:t>="AND"&gt;</a:t>
-            </a:r>
-            <a:br>
-              <a:rPr lang="en-US" sz="3200" dirty="0"/>
-            </a:br>
-            <a:r>
-              <a:rPr lang="en-US" sz="3200" dirty="0"/>
-              <a:t>&lt;</a:t>
-            </a:r>
-            <a:r>
-              <a:rPr lang="en-US" sz="3200" dirty="0" err="1"/>
-              <a:t>CvTerm</a:t>
-            </a:r>
-            <a:r>
-              <a:rPr lang="en-US" sz="3200" dirty="0"/>
-              <a:t> </a:t>
-            </a:r>
-            <a:r>
-              <a:rPr lang="en-US" sz="3200" dirty="0" err="1"/>
-              <a:t>termAccession</a:t>
-            </a:r>
-            <a:r>
-              <a:rPr lang="en-US" sz="3200" dirty="0"/>
-              <a:t>="NMR:1400059" </a:t>
-            </a:r>
-            <a:r>
-              <a:rPr lang="en-US" sz="3200" dirty="0" err="1" smtClean="0"/>
-              <a:t>useTerm</a:t>
-            </a:r>
-            <a:r>
-              <a:rPr lang="en-US" sz="3200" dirty="0"/>
-              <a:t>="false" </a:t>
-            </a:r>
-            <a:r>
-              <a:rPr lang="en-US" sz="3200" dirty="0" err="1"/>
-              <a:t>termName</a:t>
-            </a:r>
-            <a:r>
-              <a:rPr lang="en-US" sz="3200" dirty="0"/>
-              <a:t>="NMR </a:t>
-            </a:r>
-            <a:r>
-              <a:rPr lang="en-US" sz="3200" dirty="0" smtClean="0"/>
-              <a:t>instrument“ </a:t>
-            </a:r>
-            <a:r>
-              <a:rPr lang="en-US" sz="3200" dirty="0" err="1" smtClean="0"/>
-              <a:t>isRepeatable</a:t>
-            </a:r>
-            <a:r>
-              <a:rPr lang="en-US" sz="3200" dirty="0"/>
-              <a:t>="false" </a:t>
-            </a:r>
-            <a:r>
-              <a:rPr lang="en-US" sz="3200" dirty="0" err="1"/>
-              <a:t>allowChildren</a:t>
-            </a:r>
-            <a:r>
-              <a:rPr lang="en-US" sz="3200" dirty="0"/>
-              <a:t>="true" </a:t>
-            </a:r>
-            <a:r>
-              <a:rPr lang="en-US" sz="3200" dirty="0" err="1"/>
-              <a:t>cvIdentifierRef</a:t>
-            </a:r>
-            <a:r>
-              <a:rPr lang="en-US" sz="3200" dirty="0"/>
-              <a:t>="NMR</a:t>
-            </a:r>
-            <a:r>
-              <a:rPr lang="en-US" sz="3200" dirty="0" smtClean="0"/>
-              <a:t>"/&gt;</a:t>
-            </a:r>
-            <a:r>
-              <a:rPr lang="en-US" sz="3200" dirty="0"/>
-              <a:t/>
-            </a:r>
-            <a:br>
-              <a:rPr lang="en-US" sz="3200" dirty="0"/>
-            </a:br>
-            <a:r>
-              <a:rPr lang="en-US" sz="3200" dirty="0"/>
-              <a:t>&lt;</a:t>
-            </a:r>
-            <a:r>
-              <a:rPr lang="en-US" sz="3200" dirty="0" err="1"/>
-              <a:t>CvTerm</a:t>
-            </a:r>
-            <a:r>
-              <a:rPr lang="en-US" sz="3200" dirty="0"/>
-              <a:t> </a:t>
-            </a:r>
-            <a:r>
-              <a:rPr lang="en-US" sz="3200" dirty="0" err="1"/>
-              <a:t>termAccession</a:t>
-            </a:r>
-            <a:r>
-              <a:rPr lang="en-US" sz="3200" dirty="0"/>
-              <a:t>="NMR:1400014" </a:t>
-            </a:r>
-            <a:r>
-              <a:rPr lang="en-US" sz="3200" dirty="0" err="1">
-                <a:solidFill>
-                  <a:srgbClr val="00B050"/>
-                </a:solidFill>
-              </a:rPr>
-              <a:t>useTerm</a:t>
-            </a:r>
-            <a:r>
-              <a:rPr lang="en-US" sz="3200" dirty="0">
-                <a:solidFill>
-                  <a:srgbClr val="00B050"/>
-                </a:solidFill>
-              </a:rPr>
-              <a:t>="false" </a:t>
-            </a:r>
-            <a:r>
-              <a:rPr lang="en-US" sz="3200" dirty="0" err="1">
-                <a:solidFill>
-                  <a:schemeClr val="accent1"/>
-                </a:solidFill>
-              </a:rPr>
-              <a:t>termName</a:t>
-            </a:r>
-            <a:r>
-              <a:rPr lang="en-US" sz="3200" dirty="0">
-                <a:solidFill>
-                  <a:schemeClr val="accent1"/>
-                </a:solidFill>
-              </a:rPr>
-              <a:t>="NMR probe"</a:t>
-            </a:r>
-            <a:br>
-              <a:rPr lang="en-US" sz="3200" dirty="0">
-                <a:solidFill>
-                  <a:schemeClr val="accent1"/>
-                </a:solidFill>
-              </a:rPr>
-            </a:br>
-            <a:r>
-              <a:rPr lang="en-US" sz="3200" dirty="0" err="1"/>
-              <a:t>isRepeatable</a:t>
-            </a:r>
-            <a:r>
-              <a:rPr lang="en-US" sz="3200" dirty="0"/>
-              <a:t>="false" </a:t>
-            </a:r>
-            <a:r>
-              <a:rPr lang="en-US" sz="3200" dirty="0" err="1"/>
-              <a:t>allowChildren</a:t>
-            </a:r>
-            <a:r>
-              <a:rPr lang="en-US" sz="3200" dirty="0"/>
-              <a:t>="true" </a:t>
-            </a:r>
-            <a:r>
-              <a:rPr lang="en-US" sz="3200" dirty="0" err="1"/>
-              <a:t>cvIdentifierRef</a:t>
-            </a:r>
-            <a:r>
-              <a:rPr lang="en-US" sz="3200" dirty="0"/>
-              <a:t>="NMR"/&gt;</a:t>
-            </a:r>
-            <a:br>
-              <a:rPr lang="en-US" sz="3200" dirty="0"/>
-            </a:br>
-            <a:r>
               <a:rPr lang="en-US" sz="3200" dirty="0"/>
               <a:t>&lt;/</a:t>
             </a:r>
@@ -10003,7 +9623,6 @@
               <a:rPr lang="en-US" sz="3200" dirty="0"/>
               <a:t>&gt;</a:t>
             </a:r>
-            <a:endParaRPr lang="en-US" sz="3200" dirty="0"/>
           </a:p>
         </p:txBody>
       </p:sp>
@@ -10029,7 +9648,7 @@
         </p:blipFill>
         <p:spPr>
           <a:xfrm>
-            <a:off x="17269390" y="15293284"/>
+            <a:off x="18036306" y="14437878"/>
             <a:ext cx="8310076" cy="12883537"/>
           </a:xfrm>
           <a:prstGeom prst="rect">

</xml_diff>